<commit_message>
minor clearning, adding new ppt slides
</commit_message>
<xml_diff>
--- a/An Electric Craving.pptx
+++ b/An Electric Craving.pptx
@@ -7,10 +7,20 @@
   <p:sldIdLst>
     <p:sldId id="256" r:id="rId2"/>
     <p:sldId id="259" r:id="rId3"/>
-    <p:sldId id="258" r:id="rId4"/>
-    <p:sldId id="260" r:id="rId5"/>
-    <p:sldId id="261" r:id="rId6"/>
-    <p:sldId id="262" r:id="rId7"/>
+    <p:sldId id="273" r:id="rId4"/>
+    <p:sldId id="258" r:id="rId5"/>
+    <p:sldId id="274" r:id="rId6"/>
+    <p:sldId id="263" r:id="rId7"/>
+    <p:sldId id="270" r:id="rId8"/>
+    <p:sldId id="275" r:id="rId9"/>
+    <p:sldId id="271" r:id="rId10"/>
+    <p:sldId id="272" r:id="rId11"/>
+    <p:sldId id="277" r:id="rId12"/>
+    <p:sldId id="276" r:id="rId13"/>
+    <p:sldId id="278" r:id="rId14"/>
+    <p:sldId id="260" r:id="rId15"/>
+    <p:sldId id="266" r:id="rId16"/>
+    <p:sldId id="262" r:id="rId17"/>
   </p:sldIdLst>
   <p:sldSz cx="12192000" cy="6858000"/>
   <p:notesSz cx="6858000" cy="9144000"/>
@@ -120,7 +130,9 @@
         <p14:section name="Intro" id="{E5CC18EC-CAB4-4173-B536-F7E6F9CD53A9}">
           <p14:sldIdLst>
             <p14:sldId id="259"/>
+            <p14:sldId id="273"/>
             <p14:sldId id="258"/>
+            <p14:sldId id="274"/>
           </p14:sldIdLst>
         </p14:section>
         <p14:section name="Part 1" id="{5A82E57F-FAF3-4B12-930E-E24CBC09F95C}">
@@ -130,15 +142,24 @@
           <p14:sldIdLst/>
         </p14:section>
         <p14:section name="Part 3" id="{4FC5B730-411F-4186-90E8-1BF9E4959108}">
-          <p14:sldIdLst/>
+          <p14:sldIdLst>
+            <p14:sldId id="263"/>
+            <p14:sldId id="270"/>
+            <p14:sldId id="275"/>
+            <p14:sldId id="271"/>
+            <p14:sldId id="272"/>
+            <p14:sldId id="277"/>
+            <p14:sldId id="276"/>
+            <p14:sldId id="278"/>
+          </p14:sldIdLst>
         </p14:section>
         <p14:section name="Part 4" id="{379F2DD4-0BE2-4E0A-BF25-CE7EBDA1B36E}">
           <p14:sldIdLst/>
         </p14:section>
-        <p14:section name="utility slides" id="{9CF3B635-A2D3-40F2-B264-3776C128982B}">
+        <p14:section name="utility slides DO NOT DELETE" id="{9CF3B635-A2D3-40F2-B264-3776C128982B}">
           <p14:sldIdLst>
             <p14:sldId id="260"/>
-            <p14:sldId id="261"/>
+            <p14:sldId id="266"/>
             <p14:sldId id="262"/>
           </p14:sldIdLst>
         </p14:section>
@@ -149,6 +170,32 @@
     </p:ext>
   </p:extLst>
 </p:presentation>
+</file>
+
+<file path=ppt/commentAuthors.xml><?xml version="1.0" encoding="utf-8"?>
+<p:cmAuthorLst xmlns:a="http://schemas.openxmlformats.org/drawingml/2006/main" xmlns:r="http://schemas.openxmlformats.org/officeDocument/2006/relationships" xmlns:p="http://schemas.openxmlformats.org/presentationml/2006/main">
+  <p:cmAuthor id="1" name="Sanabu W" initials="SW" lastIdx="1" clrIdx="0">
+    <p:extLst>
+      <p:ext uri="{19B8F6BF-5375-455C-9EA6-DF929625EA0E}">
+        <p15:presenceInfo xmlns:p15="http://schemas.microsoft.com/office/powerpoint/2012/main" userId="42a3753cb066bb5d" providerId="Windows Live"/>
+      </p:ext>
+    </p:extLst>
+  </p:cmAuthor>
+</p:cmAuthorLst>
+</file>
+
+<file path=ppt/comments/comment1.xml><?xml version="1.0" encoding="utf-8"?>
+<p:cmLst xmlns:a="http://schemas.openxmlformats.org/drawingml/2006/main" xmlns:r="http://schemas.openxmlformats.org/officeDocument/2006/relationships" xmlns:p="http://schemas.openxmlformats.org/presentationml/2006/main">
+  <p:cm authorId="1" dt="2021-01-14T21:57:34.024" idx="1">
+    <p:pos x="10" y="10"/>
+    <p:text>DELETE?</p:text>
+    <p:extLst>
+      <p:ext uri="{C676402C-5697-4E1C-873F-D02D1690AC5C}">
+        <p15:threadingInfo xmlns:p15="http://schemas.microsoft.com/office/powerpoint/2012/main" timeZoneBias="480"/>
+      </p:ext>
+    </p:extLst>
+  </p:cm>
+</p:cmLst>
 </file>
 
 <file path=ppt/slideLayouts/slideLayout1.xml><?xml version="1.0" encoding="utf-8"?>
@@ -6706,6 +6753,1176 @@
 </p:sld>
 </file>
 
+<file path=ppt/slides/slide10.xml><?xml version="1.0" encoding="utf-8"?>
+<p:sld xmlns:a="http://schemas.openxmlformats.org/drawingml/2006/main" xmlns:r="http://schemas.openxmlformats.org/officeDocument/2006/relationships" xmlns:p="http://schemas.openxmlformats.org/presentationml/2006/main">
+  <p:cSld>
+    <p:spTree>
+      <p:nvGrpSpPr>
+        <p:cNvPr id="1" name=""/>
+        <p:cNvGrpSpPr/>
+        <p:nvPr/>
+      </p:nvGrpSpPr>
+      <p:grpSpPr>
+        <a:xfrm>
+          <a:off x="0" y="0"/>
+          <a:ext cx="0" cy="0"/>
+          <a:chOff x="0" y="0"/>
+          <a:chExt cx="0" cy="0"/>
+        </a:xfrm>
+      </p:grpSpPr>
+      <p:sp>
+        <p:nvSpPr>
+          <p:cNvPr id="2" name="Title 1">
+            <a:extLst>
+              <a:ext uri="{FF2B5EF4-FFF2-40B4-BE49-F238E27FC236}">
+                <a16:creationId xmlns:a16="http://schemas.microsoft.com/office/drawing/2014/main" id="{DF2314C0-5399-49F6-8AD6-87EDDFF32150}"/>
+              </a:ext>
+            </a:extLst>
+          </p:cNvPr>
+          <p:cNvSpPr>
+            <a:spLocks noGrp="1"/>
+          </p:cNvSpPr>
+          <p:nvPr>
+            <p:ph type="title"/>
+          </p:nvPr>
+        </p:nvSpPr>
+        <p:spPr>
+          <a:xfrm>
+            <a:off x="1577075" y="162340"/>
+            <a:ext cx="10018713" cy="559904"/>
+          </a:xfrm>
+        </p:spPr>
+        <p:txBody>
+          <a:bodyPr>
+            <a:normAutofit/>
+          </a:bodyPr>
+          <a:lstStyle/>
+          <a:p>
+            <a:pPr algn="l"/>
+            <a:r>
+              <a:rPr lang="en-US" sz="2400" dirty="0"/>
+              <a:t>Q.4.1 - City List and City Population Density (cleaning)</a:t>
+            </a:r>
+          </a:p>
+        </p:txBody>
+      </p:sp>
+      <p:pic>
+        <p:nvPicPr>
+          <p:cNvPr id="7" name="Picture 6">
+            <a:extLst>
+              <a:ext uri="{FF2B5EF4-FFF2-40B4-BE49-F238E27FC236}">
+                <a16:creationId xmlns:a16="http://schemas.microsoft.com/office/drawing/2014/main" id="{29A4A7AE-12E7-4FAE-9D15-E7FC4C6C50E5}"/>
+              </a:ext>
+            </a:extLst>
+          </p:cNvPr>
+          <p:cNvPicPr>
+            <a:picLocks noChangeAspect="1"/>
+          </p:cNvPicPr>
+          <p:nvPr/>
+        </p:nvPicPr>
+        <p:blipFill>
+          <a:blip r:embed="rId2">
+            <a:extLst>
+              <a:ext uri="{28A0092B-C50C-407E-A947-70E740481C1C}">
+                <a14:useLocalDpi xmlns:a14="http://schemas.microsoft.com/office/drawing/2010/main" val="0"/>
+              </a:ext>
+            </a:extLst>
+          </a:blip>
+          <a:stretch>
+            <a:fillRect/>
+          </a:stretch>
+        </p:blipFill>
+        <p:spPr>
+          <a:xfrm>
+            <a:off x="1775794" y="881044"/>
+            <a:ext cx="7793080" cy="4411955"/>
+          </a:xfrm>
+          <a:prstGeom prst="rect">
+            <a:avLst/>
+          </a:prstGeom>
+        </p:spPr>
+      </p:pic>
+      <p:sp>
+        <p:nvSpPr>
+          <p:cNvPr id="12" name="TextBox 11">
+            <a:extLst>
+              <a:ext uri="{FF2B5EF4-FFF2-40B4-BE49-F238E27FC236}">
+                <a16:creationId xmlns:a16="http://schemas.microsoft.com/office/drawing/2014/main" id="{896C4210-18BE-40E3-8494-B06230437C3C}"/>
+              </a:ext>
+            </a:extLst>
+          </p:cNvPr>
+          <p:cNvSpPr txBox="1"/>
+          <p:nvPr/>
+        </p:nvSpPr>
+        <p:spPr>
+          <a:xfrm>
+            <a:off x="1775794" y="5292999"/>
+            <a:ext cx="6096000" cy="369332"/>
+          </a:xfrm>
+          <a:prstGeom prst="rect">
+            <a:avLst/>
+          </a:prstGeom>
+          <a:noFill/>
+        </p:spPr>
+        <p:txBody>
+          <a:bodyPr wrap="square">
+            <a:spAutoFit/>
+          </a:bodyPr>
+          <a:lstStyle/>
+          <a:p>
+            <a:r>
+              <a:rPr lang="en-US" dirty="0"/>
+              <a:t>*Note line 9</a:t>
+            </a:r>
+          </a:p>
+        </p:txBody>
+      </p:sp>
+    </p:spTree>
+    <p:extLst>
+      <p:ext uri="{BB962C8B-B14F-4D97-AF65-F5344CB8AC3E}">
+        <p14:creationId xmlns:p14="http://schemas.microsoft.com/office/powerpoint/2010/main" val="524697388"/>
+      </p:ext>
+    </p:extLst>
+  </p:cSld>
+  <p:clrMapOvr>
+    <a:masterClrMapping/>
+  </p:clrMapOvr>
+</p:sld>
+</file>
+
+<file path=ppt/slides/slide11.xml><?xml version="1.0" encoding="utf-8"?>
+<p:sld xmlns:a="http://schemas.openxmlformats.org/drawingml/2006/main" xmlns:r="http://schemas.openxmlformats.org/officeDocument/2006/relationships" xmlns:p="http://schemas.openxmlformats.org/presentationml/2006/main">
+  <p:cSld>
+    <p:spTree>
+      <p:nvGrpSpPr>
+        <p:cNvPr id="1" name=""/>
+        <p:cNvGrpSpPr/>
+        <p:nvPr/>
+      </p:nvGrpSpPr>
+      <p:grpSpPr>
+        <a:xfrm>
+          <a:off x="0" y="0"/>
+          <a:ext cx="0" cy="0"/>
+          <a:chOff x="0" y="0"/>
+          <a:chExt cx="0" cy="0"/>
+        </a:xfrm>
+      </p:grpSpPr>
+      <p:sp>
+        <p:nvSpPr>
+          <p:cNvPr id="2" name="Title 1">
+            <a:extLst>
+              <a:ext uri="{FF2B5EF4-FFF2-40B4-BE49-F238E27FC236}">
+                <a16:creationId xmlns:a16="http://schemas.microsoft.com/office/drawing/2014/main" id="{DF2314C0-5399-49F6-8AD6-87EDDFF32150}"/>
+              </a:ext>
+            </a:extLst>
+          </p:cNvPr>
+          <p:cNvSpPr>
+            <a:spLocks noGrp="1"/>
+          </p:cNvSpPr>
+          <p:nvPr>
+            <p:ph type="title"/>
+          </p:nvPr>
+        </p:nvSpPr>
+        <p:spPr>
+          <a:xfrm>
+            <a:off x="1577075" y="162340"/>
+            <a:ext cx="10018713" cy="559904"/>
+          </a:xfrm>
+        </p:spPr>
+        <p:txBody>
+          <a:bodyPr>
+            <a:normAutofit/>
+          </a:bodyPr>
+          <a:lstStyle/>
+          <a:p>
+            <a:pPr algn="l"/>
+            <a:r>
+              <a:rPr lang="en-US" sz="2400" dirty="0"/>
+              <a:t>Q.4.1 – Urban Areas (cleaning)</a:t>
+            </a:r>
+          </a:p>
+        </p:txBody>
+      </p:sp>
+      <p:sp>
+        <p:nvSpPr>
+          <p:cNvPr id="3" name="Content Placeholder 2">
+            <a:extLst>
+              <a:ext uri="{FF2B5EF4-FFF2-40B4-BE49-F238E27FC236}">
+                <a16:creationId xmlns:a16="http://schemas.microsoft.com/office/drawing/2014/main" id="{24420B42-4123-42C4-A3EE-B8CED6810E04}"/>
+              </a:ext>
+            </a:extLst>
+          </p:cNvPr>
+          <p:cNvSpPr>
+            <a:spLocks noGrp="1"/>
+          </p:cNvSpPr>
+          <p:nvPr>
+            <p:ph idx="1"/>
+          </p:nvPr>
+        </p:nvSpPr>
+        <p:spPr>
+          <a:xfrm>
+            <a:off x="1653275" y="2003500"/>
+            <a:ext cx="8017198" cy="2851000"/>
+          </a:xfrm>
+        </p:spPr>
+        <p:txBody>
+          <a:bodyPr>
+            <a:normAutofit/>
+          </a:bodyPr>
+          <a:lstStyle/>
+          <a:p>
+            <a:pPr marL="0" indent="0">
+              <a:buNone/>
+            </a:pPr>
+            <a:r>
+              <a:rPr lang="en-US" sz="2000" dirty="0"/>
+              <a:t>Source:</a:t>
+            </a:r>
+          </a:p>
+          <a:p>
+            <a:r>
+              <a:rPr lang="en-US" sz="1600" dirty="0">
+                <a:hlinkClick r:id="rId2"/>
+              </a:rPr>
+              <a:t>https://en.wikipedia.org/wiki/List_of_United_States_urban_areas</a:t>
+            </a:r>
+            <a:endParaRPr lang="en-US" sz="1600" dirty="0"/>
+          </a:p>
+          <a:p>
+            <a:pPr marL="0" indent="0">
+              <a:buNone/>
+            </a:pPr>
+            <a:endParaRPr lang="en-US" sz="1600" dirty="0"/>
+          </a:p>
+          <a:p>
+            <a:pPr marL="0" indent="0">
+              <a:buNone/>
+            </a:pPr>
+            <a:r>
+              <a:rPr lang="en-US" sz="2000" dirty="0"/>
+              <a:t>General Info:</a:t>
+            </a:r>
+          </a:p>
+          <a:p>
+            <a:r>
+              <a:rPr lang="en-US" sz="1600" dirty="0"/>
+              <a:t>A list of urban areas in the United States as defined by the United States Census Bureau</a:t>
+            </a:r>
+          </a:p>
+          <a:p>
+            <a:r>
+              <a:rPr lang="en-US" sz="1600" dirty="0"/>
+              <a:t>An urbanized area (UA) is an urban area with population over 50,000</a:t>
+            </a:r>
+          </a:p>
+          <a:p>
+            <a:r>
+              <a:rPr lang="en-US" sz="1600" dirty="0"/>
+              <a:t>Used to limit cities to observe for API call</a:t>
+            </a:r>
+          </a:p>
+        </p:txBody>
+      </p:sp>
+    </p:spTree>
+    <p:extLst>
+      <p:ext uri="{BB962C8B-B14F-4D97-AF65-F5344CB8AC3E}">
+        <p14:creationId xmlns:p14="http://schemas.microsoft.com/office/powerpoint/2010/main" val="3588059975"/>
+      </p:ext>
+    </p:extLst>
+  </p:cSld>
+  <p:clrMapOvr>
+    <a:masterClrMapping/>
+  </p:clrMapOvr>
+</p:sld>
+</file>
+
+<file path=ppt/slides/slide12.xml><?xml version="1.0" encoding="utf-8"?>
+<p:sld xmlns:a="http://schemas.openxmlformats.org/drawingml/2006/main" xmlns:r="http://schemas.openxmlformats.org/officeDocument/2006/relationships" xmlns:p="http://schemas.openxmlformats.org/presentationml/2006/main">
+  <p:cSld>
+    <p:spTree>
+      <p:nvGrpSpPr>
+        <p:cNvPr id="1" name=""/>
+        <p:cNvGrpSpPr/>
+        <p:nvPr/>
+      </p:nvGrpSpPr>
+      <p:grpSpPr>
+        <a:xfrm>
+          <a:off x="0" y="0"/>
+          <a:ext cx="0" cy="0"/>
+          <a:chOff x="0" y="0"/>
+          <a:chExt cx="0" cy="0"/>
+        </a:xfrm>
+      </p:grpSpPr>
+      <p:sp>
+        <p:nvSpPr>
+          <p:cNvPr id="2" name="Title 1">
+            <a:extLst>
+              <a:ext uri="{FF2B5EF4-FFF2-40B4-BE49-F238E27FC236}">
+                <a16:creationId xmlns:a16="http://schemas.microsoft.com/office/drawing/2014/main" id="{DF2314C0-5399-49F6-8AD6-87EDDFF32150}"/>
+              </a:ext>
+            </a:extLst>
+          </p:cNvPr>
+          <p:cNvSpPr>
+            <a:spLocks noGrp="1"/>
+          </p:cNvSpPr>
+          <p:nvPr>
+            <p:ph type="title"/>
+          </p:nvPr>
+        </p:nvSpPr>
+        <p:spPr>
+          <a:xfrm>
+            <a:off x="1577075" y="162340"/>
+            <a:ext cx="10018713" cy="559904"/>
+          </a:xfrm>
+        </p:spPr>
+        <p:txBody>
+          <a:bodyPr>
+            <a:normAutofit/>
+          </a:bodyPr>
+          <a:lstStyle/>
+          <a:p>
+            <a:pPr algn="l"/>
+            <a:r>
+              <a:rPr lang="en-US" sz="2400" dirty="0"/>
+              <a:t>Q.4.1 - City List and City Population Density (cleaning)</a:t>
+            </a:r>
+          </a:p>
+        </p:txBody>
+      </p:sp>
+      <p:pic>
+        <p:nvPicPr>
+          <p:cNvPr id="4" name="Picture 3">
+            <a:extLst>
+              <a:ext uri="{FF2B5EF4-FFF2-40B4-BE49-F238E27FC236}">
+                <a16:creationId xmlns:a16="http://schemas.microsoft.com/office/drawing/2014/main" id="{B5B2ED3C-2EC0-4539-A19E-070EB153DDD4}"/>
+              </a:ext>
+            </a:extLst>
+          </p:cNvPr>
+          <p:cNvPicPr>
+            <a:picLocks noChangeAspect="1"/>
+          </p:cNvPicPr>
+          <p:nvPr/>
+        </p:nvPicPr>
+        <p:blipFill>
+          <a:blip r:embed="rId2">
+            <a:extLst>
+              <a:ext uri="{28A0092B-C50C-407E-A947-70E740481C1C}">
+                <a14:useLocalDpi xmlns:a14="http://schemas.microsoft.com/office/drawing/2010/main" val="0"/>
+              </a:ext>
+            </a:extLst>
+          </a:blip>
+          <a:stretch>
+            <a:fillRect/>
+          </a:stretch>
+        </p:blipFill>
+        <p:spPr>
+          <a:xfrm>
+            <a:off x="472936" y="1505025"/>
+            <a:ext cx="7261663" cy="3990611"/>
+          </a:xfrm>
+          <a:prstGeom prst="rect">
+            <a:avLst/>
+          </a:prstGeom>
+        </p:spPr>
+      </p:pic>
+      <p:sp>
+        <p:nvSpPr>
+          <p:cNvPr id="6" name="Content Placeholder 2">
+            <a:extLst>
+              <a:ext uri="{FF2B5EF4-FFF2-40B4-BE49-F238E27FC236}">
+                <a16:creationId xmlns:a16="http://schemas.microsoft.com/office/drawing/2014/main" id="{A647DB52-BD37-4C30-B6F9-7922B193B679}"/>
+              </a:ext>
+            </a:extLst>
+          </p:cNvPr>
+          <p:cNvSpPr>
+            <a:spLocks noGrp="1"/>
+          </p:cNvSpPr>
+          <p:nvPr>
+            <p:ph idx="1"/>
+          </p:nvPr>
+        </p:nvSpPr>
+        <p:spPr>
+          <a:xfrm>
+            <a:off x="2476911" y="723761"/>
+            <a:ext cx="7345251" cy="781264"/>
+          </a:xfrm>
+        </p:spPr>
+        <p:txBody>
+          <a:bodyPr>
+            <a:normAutofit/>
+          </a:bodyPr>
+          <a:lstStyle/>
+          <a:p>
+            <a:pPr marL="0" indent="0" algn="ctr">
+              <a:buNone/>
+            </a:pPr>
+            <a:r>
+              <a:rPr lang="en-US" sz="2000" dirty="0"/>
+              <a:t>Creating state-unique city names within Excel for merging</a:t>
+            </a:r>
+            <a:endParaRPr lang="en-US" sz="1600" dirty="0"/>
+          </a:p>
+        </p:txBody>
+      </p:sp>
+      <p:pic>
+        <p:nvPicPr>
+          <p:cNvPr id="8" name="Picture 7">
+            <a:extLst>
+              <a:ext uri="{FF2B5EF4-FFF2-40B4-BE49-F238E27FC236}">
+                <a16:creationId xmlns:a16="http://schemas.microsoft.com/office/drawing/2014/main" id="{668DCF05-4FE7-414B-8697-4671A37FF054}"/>
+              </a:ext>
+            </a:extLst>
+          </p:cNvPr>
+          <p:cNvPicPr>
+            <a:picLocks noChangeAspect="1"/>
+          </p:cNvPicPr>
+          <p:nvPr/>
+        </p:nvPicPr>
+        <p:blipFill>
+          <a:blip r:embed="rId3">
+            <a:extLst>
+              <a:ext uri="{28A0092B-C50C-407E-A947-70E740481C1C}">
+                <a14:useLocalDpi xmlns:a14="http://schemas.microsoft.com/office/drawing/2010/main" val="0"/>
+              </a:ext>
+            </a:extLst>
+          </a:blip>
+          <a:stretch>
+            <a:fillRect/>
+          </a:stretch>
+        </p:blipFill>
+        <p:spPr>
+          <a:xfrm>
+            <a:off x="3616048" y="3412903"/>
+            <a:ext cx="8103016" cy="2863997"/>
+          </a:xfrm>
+          <a:prstGeom prst="rect">
+            <a:avLst/>
+          </a:prstGeom>
+        </p:spPr>
+      </p:pic>
+    </p:spTree>
+    <p:extLst>
+      <p:ext uri="{BB962C8B-B14F-4D97-AF65-F5344CB8AC3E}">
+        <p14:creationId xmlns:p14="http://schemas.microsoft.com/office/powerpoint/2010/main" val="2612038234"/>
+      </p:ext>
+    </p:extLst>
+  </p:cSld>
+  <p:clrMapOvr>
+    <a:masterClrMapping/>
+  </p:clrMapOvr>
+</p:sld>
+</file>
+
+<file path=ppt/slides/slide13.xml><?xml version="1.0" encoding="utf-8"?>
+<p:sld xmlns:a="http://schemas.openxmlformats.org/drawingml/2006/main" xmlns:r="http://schemas.openxmlformats.org/officeDocument/2006/relationships" xmlns:p="http://schemas.openxmlformats.org/presentationml/2006/main">
+  <p:cSld>
+    <p:spTree>
+      <p:nvGrpSpPr>
+        <p:cNvPr id="1" name=""/>
+        <p:cNvGrpSpPr/>
+        <p:nvPr/>
+      </p:nvGrpSpPr>
+      <p:grpSpPr>
+        <a:xfrm>
+          <a:off x="0" y="0"/>
+          <a:ext cx="0" cy="0"/>
+          <a:chOff x="0" y="0"/>
+          <a:chExt cx="0" cy="0"/>
+        </a:xfrm>
+      </p:grpSpPr>
+      <p:sp>
+        <p:nvSpPr>
+          <p:cNvPr id="2" name="Title 1">
+            <a:extLst>
+              <a:ext uri="{FF2B5EF4-FFF2-40B4-BE49-F238E27FC236}">
+                <a16:creationId xmlns:a16="http://schemas.microsoft.com/office/drawing/2014/main" id="{DF2314C0-5399-49F6-8AD6-87EDDFF32150}"/>
+              </a:ext>
+            </a:extLst>
+          </p:cNvPr>
+          <p:cNvSpPr>
+            <a:spLocks noGrp="1"/>
+          </p:cNvSpPr>
+          <p:nvPr>
+            <p:ph type="title"/>
+          </p:nvPr>
+        </p:nvSpPr>
+        <p:spPr>
+          <a:xfrm>
+            <a:off x="1577075" y="162340"/>
+            <a:ext cx="10018713" cy="559904"/>
+          </a:xfrm>
+        </p:spPr>
+        <p:txBody>
+          <a:bodyPr>
+            <a:normAutofit/>
+          </a:bodyPr>
+          <a:lstStyle/>
+          <a:p>
+            <a:pPr algn="l"/>
+            <a:r>
+              <a:rPr lang="en-US" sz="2400" dirty="0"/>
+              <a:t>Q.4.1 – Merge to limit city count</a:t>
+            </a:r>
+          </a:p>
+        </p:txBody>
+      </p:sp>
+      <p:pic>
+        <p:nvPicPr>
+          <p:cNvPr id="5" name="Picture 4">
+            <a:extLst>
+              <a:ext uri="{FF2B5EF4-FFF2-40B4-BE49-F238E27FC236}">
+                <a16:creationId xmlns:a16="http://schemas.microsoft.com/office/drawing/2014/main" id="{42D5301A-7B53-4BB6-8FC8-CFE565FA3EB1}"/>
+              </a:ext>
+            </a:extLst>
+          </p:cNvPr>
+          <p:cNvPicPr>
+            <a:picLocks noChangeAspect="1"/>
+          </p:cNvPicPr>
+          <p:nvPr/>
+        </p:nvPicPr>
+        <p:blipFill>
+          <a:blip r:embed="rId2">
+            <a:extLst>
+              <a:ext uri="{28A0092B-C50C-407E-A947-70E740481C1C}">
+                <a14:useLocalDpi xmlns:a14="http://schemas.microsoft.com/office/drawing/2010/main" val="0"/>
+              </a:ext>
+            </a:extLst>
+          </a:blip>
+          <a:stretch>
+            <a:fillRect/>
+          </a:stretch>
+        </p:blipFill>
+        <p:spPr>
+          <a:xfrm>
+            <a:off x="699842" y="2013234"/>
+            <a:ext cx="10792315" cy="2831532"/>
+          </a:xfrm>
+          <a:prstGeom prst="rect">
+            <a:avLst/>
+          </a:prstGeom>
+        </p:spPr>
+      </p:pic>
+    </p:spTree>
+    <p:extLst>
+      <p:ext uri="{BB962C8B-B14F-4D97-AF65-F5344CB8AC3E}">
+        <p14:creationId xmlns:p14="http://schemas.microsoft.com/office/powerpoint/2010/main" val="2914855997"/>
+      </p:ext>
+    </p:extLst>
+  </p:cSld>
+  <p:clrMapOvr>
+    <a:masterClrMapping/>
+  </p:clrMapOvr>
+</p:sld>
+</file>
+
+<file path=ppt/slides/slide14.xml><?xml version="1.0" encoding="utf-8"?>
+<p:sld xmlns:a="http://schemas.openxmlformats.org/drawingml/2006/main" xmlns:r="http://schemas.openxmlformats.org/officeDocument/2006/relationships" xmlns:p="http://schemas.openxmlformats.org/presentationml/2006/main">
+  <p:cSld>
+    <p:spTree>
+      <p:nvGrpSpPr>
+        <p:cNvPr id="1" name=""/>
+        <p:cNvGrpSpPr/>
+        <p:nvPr/>
+      </p:nvGrpSpPr>
+      <p:grpSpPr>
+        <a:xfrm>
+          <a:off x="0" y="0"/>
+          <a:ext cx="0" cy="0"/>
+          <a:chOff x="0" y="0"/>
+          <a:chExt cx="0" cy="0"/>
+        </a:xfrm>
+      </p:grpSpPr>
+      <p:sp>
+        <p:nvSpPr>
+          <p:cNvPr id="2" name="Title 1">
+            <a:extLst>
+              <a:ext uri="{FF2B5EF4-FFF2-40B4-BE49-F238E27FC236}">
+                <a16:creationId xmlns:a16="http://schemas.microsoft.com/office/drawing/2014/main" id="{2B2D7A7B-92DB-4A3F-8466-5ABC67A21B0D}"/>
+              </a:ext>
+            </a:extLst>
+          </p:cNvPr>
+          <p:cNvSpPr>
+            <a:spLocks noGrp="1"/>
+          </p:cNvSpPr>
+          <p:nvPr>
+            <p:ph type="ctrTitle"/>
+          </p:nvPr>
+        </p:nvSpPr>
+        <p:spPr>
+          <a:xfrm>
+            <a:off x="5287616" y="346399"/>
+            <a:ext cx="6559963" cy="2616199"/>
+          </a:xfrm>
+        </p:spPr>
+        <p:txBody>
+          <a:bodyPr/>
+          <a:lstStyle/>
+          <a:p>
+            <a:r>
+              <a:rPr lang="en-US" dirty="0"/>
+              <a:t>An Electric Craving</a:t>
+            </a:r>
+          </a:p>
+        </p:txBody>
+      </p:sp>
+      <p:sp>
+        <p:nvSpPr>
+          <p:cNvPr id="3" name="Subtitle 2">
+            <a:extLst>
+              <a:ext uri="{FF2B5EF4-FFF2-40B4-BE49-F238E27FC236}">
+                <a16:creationId xmlns:a16="http://schemas.microsoft.com/office/drawing/2014/main" id="{0C8EC36A-C5A0-4D55-89AC-D45F8CB99EFD}"/>
+              </a:ext>
+            </a:extLst>
+          </p:cNvPr>
+          <p:cNvSpPr>
+            <a:spLocks noGrp="1"/>
+          </p:cNvSpPr>
+          <p:nvPr>
+            <p:ph type="subTitle" idx="1"/>
+          </p:nvPr>
+        </p:nvSpPr>
+        <p:spPr>
+          <a:xfrm>
+            <a:off x="3023220" y="3234268"/>
+            <a:ext cx="7602538" cy="946794"/>
+          </a:xfrm>
+        </p:spPr>
+        <p:txBody>
+          <a:bodyPr/>
+          <a:lstStyle/>
+          <a:p>
+            <a:r>
+              <a:rPr lang="en-US" dirty="0"/>
+              <a:t>UCSD Data Science and Programming Bootcamp</a:t>
+            </a:r>
+          </a:p>
+          <a:p>
+            <a:r>
+              <a:rPr lang="en-US" dirty="0"/>
+              <a:t>Project One</a:t>
+            </a:r>
+          </a:p>
+        </p:txBody>
+      </p:sp>
+      <p:sp>
+        <p:nvSpPr>
+          <p:cNvPr id="4" name="Subtitle 2">
+            <a:extLst>
+              <a:ext uri="{FF2B5EF4-FFF2-40B4-BE49-F238E27FC236}">
+                <a16:creationId xmlns:a16="http://schemas.microsoft.com/office/drawing/2014/main" id="{259DCBD9-1703-4781-90FC-990623A8C6CA}"/>
+              </a:ext>
+            </a:extLst>
+          </p:cNvPr>
+          <p:cNvSpPr txBox="1">
+            <a:spLocks/>
+          </p:cNvSpPr>
+          <p:nvPr/>
+        </p:nvSpPr>
+        <p:spPr>
+          <a:xfrm>
+            <a:off x="8942596" y="4228181"/>
+            <a:ext cx="1683162" cy="1430497"/>
+          </a:xfrm>
+          <a:prstGeom prst="rect">
+            <a:avLst/>
+          </a:prstGeom>
+        </p:spPr>
+        <p:txBody>
+          <a:bodyPr vert="horz" lIns="91440" tIns="45720" rIns="91440" bIns="45720" rtlCol="0" anchor="t">
+            <a:noAutofit/>
+          </a:bodyPr>
+          <a:lstStyle>
+            <a:lvl1pPr marL="0" indent="0" algn="r" defTabSz="457200" rtl="0" eaLnBrk="1" latinLnBrk="0" hangingPunct="1">
+              <a:spcBef>
+                <a:spcPct val="20000"/>
+              </a:spcBef>
+              <a:spcAft>
+                <a:spcPts val="600"/>
+              </a:spcAft>
+              <a:buClr>
+                <a:schemeClr val="accent1">
+                  <a:lumMod val="75000"/>
+                </a:schemeClr>
+              </a:buClr>
+              <a:buSzPct val="145000"/>
+              <a:buFont typeface="Arial"/>
+              <a:buNone/>
+              <a:defRPr sz="2100" kern="1200" cap="none">
+                <a:solidFill>
+                  <a:schemeClr val="tx1"/>
+                </a:solidFill>
+                <a:effectLst/>
+                <a:latin typeface="+mn-lt"/>
+                <a:ea typeface="+mn-ea"/>
+                <a:cs typeface="+mn-cs"/>
+              </a:defRPr>
+            </a:lvl1pPr>
+            <a:lvl2pPr marL="457200" indent="0" algn="ctr" defTabSz="457200" rtl="0" eaLnBrk="1" latinLnBrk="0" hangingPunct="1">
+              <a:spcBef>
+                <a:spcPct val="20000"/>
+              </a:spcBef>
+              <a:spcAft>
+                <a:spcPts val="600"/>
+              </a:spcAft>
+              <a:buClr>
+                <a:schemeClr val="accent1">
+                  <a:lumMod val="75000"/>
+                </a:schemeClr>
+              </a:buClr>
+              <a:buSzPct val="145000"/>
+              <a:buFont typeface="Arial"/>
+              <a:buNone/>
+              <a:defRPr sz="2000" kern="1200" cap="none">
+                <a:solidFill>
+                  <a:schemeClr val="tx1">
+                    <a:tint val="75000"/>
+                  </a:schemeClr>
+                </a:solidFill>
+                <a:effectLst/>
+                <a:latin typeface="+mn-lt"/>
+                <a:ea typeface="+mn-ea"/>
+                <a:cs typeface="+mn-cs"/>
+              </a:defRPr>
+            </a:lvl2pPr>
+            <a:lvl3pPr marL="914400" indent="0" algn="ctr" defTabSz="457200" rtl="0" eaLnBrk="1" latinLnBrk="0" hangingPunct="1">
+              <a:spcBef>
+                <a:spcPct val="20000"/>
+              </a:spcBef>
+              <a:spcAft>
+                <a:spcPts val="600"/>
+              </a:spcAft>
+              <a:buClr>
+                <a:schemeClr val="accent1">
+                  <a:lumMod val="75000"/>
+                </a:schemeClr>
+              </a:buClr>
+              <a:buSzPct val="145000"/>
+              <a:buFont typeface="Arial"/>
+              <a:buNone/>
+              <a:defRPr sz="1800" kern="1200" cap="none">
+                <a:solidFill>
+                  <a:schemeClr val="tx1">
+                    <a:tint val="75000"/>
+                  </a:schemeClr>
+                </a:solidFill>
+                <a:effectLst/>
+                <a:latin typeface="+mn-lt"/>
+                <a:ea typeface="+mn-ea"/>
+                <a:cs typeface="+mn-cs"/>
+              </a:defRPr>
+            </a:lvl3pPr>
+            <a:lvl4pPr marL="1371600" indent="0" algn="ctr" defTabSz="457200" rtl="0" eaLnBrk="1" latinLnBrk="0" hangingPunct="1">
+              <a:spcBef>
+                <a:spcPct val="20000"/>
+              </a:spcBef>
+              <a:spcAft>
+                <a:spcPts val="600"/>
+              </a:spcAft>
+              <a:buClr>
+                <a:schemeClr val="accent1">
+                  <a:lumMod val="75000"/>
+                </a:schemeClr>
+              </a:buClr>
+              <a:buSzPct val="145000"/>
+              <a:buFont typeface="Arial"/>
+              <a:buNone/>
+              <a:defRPr sz="1600" kern="1200" cap="none">
+                <a:solidFill>
+                  <a:schemeClr val="tx1">
+                    <a:tint val="75000"/>
+                  </a:schemeClr>
+                </a:solidFill>
+                <a:effectLst/>
+                <a:latin typeface="+mn-lt"/>
+                <a:ea typeface="+mn-ea"/>
+                <a:cs typeface="+mn-cs"/>
+              </a:defRPr>
+            </a:lvl4pPr>
+            <a:lvl5pPr marL="1828800" indent="0" algn="ctr" defTabSz="457200" rtl="0" eaLnBrk="1" latinLnBrk="0" hangingPunct="1">
+              <a:spcBef>
+                <a:spcPct val="20000"/>
+              </a:spcBef>
+              <a:spcAft>
+                <a:spcPts val="600"/>
+              </a:spcAft>
+              <a:buClr>
+                <a:schemeClr val="accent1">
+                  <a:lumMod val="75000"/>
+                </a:schemeClr>
+              </a:buClr>
+              <a:buSzPct val="145000"/>
+              <a:buFont typeface="Arial"/>
+              <a:buNone/>
+              <a:defRPr sz="1400" kern="1200" cap="none">
+                <a:solidFill>
+                  <a:schemeClr val="tx1">
+                    <a:tint val="75000"/>
+                  </a:schemeClr>
+                </a:solidFill>
+                <a:effectLst/>
+                <a:latin typeface="+mn-lt"/>
+                <a:ea typeface="+mn-ea"/>
+                <a:cs typeface="+mn-cs"/>
+              </a:defRPr>
+            </a:lvl5pPr>
+            <a:lvl6pPr marL="2286000" indent="0" algn="ctr" defTabSz="457200" rtl="0" eaLnBrk="1" latinLnBrk="0" hangingPunct="1">
+              <a:spcBef>
+                <a:spcPct val="20000"/>
+              </a:spcBef>
+              <a:spcAft>
+                <a:spcPts val="600"/>
+              </a:spcAft>
+              <a:buClr>
+                <a:schemeClr val="accent1">
+                  <a:lumMod val="75000"/>
+                </a:schemeClr>
+              </a:buClr>
+              <a:buSzPct val="145000"/>
+              <a:buFont typeface="Arial"/>
+              <a:buNone/>
+              <a:defRPr sz="1400" kern="1200" cap="none">
+                <a:solidFill>
+                  <a:schemeClr val="tx1">
+                    <a:tint val="75000"/>
+                  </a:schemeClr>
+                </a:solidFill>
+                <a:effectLst/>
+                <a:latin typeface="+mn-lt"/>
+                <a:ea typeface="+mn-ea"/>
+                <a:cs typeface="+mn-cs"/>
+              </a:defRPr>
+            </a:lvl6pPr>
+            <a:lvl7pPr marL="2743200" indent="0" algn="ctr" defTabSz="457200" rtl="0" eaLnBrk="1" latinLnBrk="0" hangingPunct="1">
+              <a:spcBef>
+                <a:spcPct val="20000"/>
+              </a:spcBef>
+              <a:spcAft>
+                <a:spcPts val="600"/>
+              </a:spcAft>
+              <a:buClr>
+                <a:schemeClr val="accent1">
+                  <a:lumMod val="75000"/>
+                </a:schemeClr>
+              </a:buClr>
+              <a:buSzPct val="145000"/>
+              <a:buFont typeface="Arial"/>
+              <a:buNone/>
+              <a:defRPr sz="1400" kern="1200" cap="none">
+                <a:solidFill>
+                  <a:schemeClr val="tx1">
+                    <a:tint val="75000"/>
+                  </a:schemeClr>
+                </a:solidFill>
+                <a:effectLst/>
+                <a:latin typeface="+mn-lt"/>
+                <a:ea typeface="+mn-ea"/>
+                <a:cs typeface="+mn-cs"/>
+              </a:defRPr>
+            </a:lvl7pPr>
+            <a:lvl8pPr marL="3200400" indent="0" algn="ctr" defTabSz="457200" rtl="0" eaLnBrk="1" latinLnBrk="0" hangingPunct="1">
+              <a:spcBef>
+                <a:spcPct val="20000"/>
+              </a:spcBef>
+              <a:spcAft>
+                <a:spcPts val="600"/>
+              </a:spcAft>
+              <a:buClr>
+                <a:schemeClr val="accent1">
+                  <a:lumMod val="75000"/>
+                </a:schemeClr>
+              </a:buClr>
+              <a:buSzPct val="145000"/>
+              <a:buFont typeface="Arial"/>
+              <a:buNone/>
+              <a:defRPr sz="1400" kern="1200" cap="none">
+                <a:solidFill>
+                  <a:schemeClr val="tx1">
+                    <a:tint val="75000"/>
+                  </a:schemeClr>
+                </a:solidFill>
+                <a:effectLst/>
+                <a:latin typeface="+mn-lt"/>
+                <a:ea typeface="+mn-ea"/>
+                <a:cs typeface="+mn-cs"/>
+              </a:defRPr>
+            </a:lvl8pPr>
+            <a:lvl9pPr marL="3657600" indent="0" algn="ctr" defTabSz="457200" rtl="0" eaLnBrk="1" latinLnBrk="0" hangingPunct="1">
+              <a:spcBef>
+                <a:spcPct val="20000"/>
+              </a:spcBef>
+              <a:spcAft>
+                <a:spcPts val="600"/>
+              </a:spcAft>
+              <a:buClr>
+                <a:schemeClr val="accent1">
+                  <a:lumMod val="75000"/>
+                </a:schemeClr>
+              </a:buClr>
+              <a:buSzPct val="145000"/>
+              <a:buFont typeface="Arial"/>
+              <a:buNone/>
+              <a:defRPr sz="1400" kern="1200" cap="none">
+                <a:solidFill>
+                  <a:schemeClr val="tx1">
+                    <a:tint val="75000"/>
+                  </a:schemeClr>
+                </a:solidFill>
+                <a:effectLst/>
+                <a:latin typeface="+mn-lt"/>
+                <a:ea typeface="+mn-ea"/>
+                <a:cs typeface="+mn-cs"/>
+              </a:defRPr>
+            </a:lvl9pPr>
+          </a:lstStyle>
+          <a:p>
+            <a:r>
+              <a:rPr lang="en-US" sz="1400" dirty="0"/>
+              <a:t>Jacob Zacarias</a:t>
+            </a:r>
+          </a:p>
+          <a:p>
+            <a:r>
+              <a:rPr lang="en-US" sz="1400" dirty="0"/>
+              <a:t>Sanabu Washizuka</a:t>
+            </a:r>
+          </a:p>
+          <a:p>
+            <a:r>
+              <a:rPr lang="en-US" sz="1400" dirty="0" err="1"/>
+              <a:t>Tanlin</a:t>
+            </a:r>
+            <a:r>
+              <a:rPr lang="en-US" sz="1400" dirty="0"/>
+              <a:t> Hung</a:t>
+            </a:r>
+          </a:p>
+          <a:p>
+            <a:r>
+              <a:rPr lang="en-US" sz="1400" dirty="0" err="1"/>
+              <a:t>Walaa</a:t>
+            </a:r>
+            <a:r>
+              <a:rPr lang="en-US" sz="1400" dirty="0"/>
+              <a:t> Alani</a:t>
+            </a:r>
+          </a:p>
+        </p:txBody>
+      </p:sp>
+    </p:spTree>
+    <p:extLst>
+      <p:ext uri="{BB962C8B-B14F-4D97-AF65-F5344CB8AC3E}">
+        <p14:creationId xmlns:p14="http://schemas.microsoft.com/office/powerpoint/2010/main" val="3822797522"/>
+      </p:ext>
+    </p:extLst>
+  </p:cSld>
+  <p:clrMapOvr>
+    <a:masterClrMapping/>
+  </p:clrMapOvr>
+</p:sld>
+</file>
+
+<file path=ppt/slides/slide15.xml><?xml version="1.0" encoding="utf-8"?>
+<p:sld xmlns:a="http://schemas.openxmlformats.org/drawingml/2006/main" xmlns:r="http://schemas.openxmlformats.org/officeDocument/2006/relationships" xmlns:p="http://schemas.openxmlformats.org/presentationml/2006/main">
+  <p:cSld>
+    <p:spTree>
+      <p:nvGrpSpPr>
+        <p:cNvPr id="1" name=""/>
+        <p:cNvGrpSpPr/>
+        <p:nvPr/>
+      </p:nvGrpSpPr>
+      <p:grpSpPr>
+        <a:xfrm>
+          <a:off x="0" y="0"/>
+          <a:ext cx="0" cy="0"/>
+          <a:chOff x="0" y="0"/>
+          <a:chExt cx="0" cy="0"/>
+        </a:xfrm>
+      </p:grpSpPr>
+      <p:sp>
+        <p:nvSpPr>
+          <p:cNvPr id="2" name="Title 1">
+            <a:extLst>
+              <a:ext uri="{FF2B5EF4-FFF2-40B4-BE49-F238E27FC236}">
+                <a16:creationId xmlns:a16="http://schemas.microsoft.com/office/drawing/2014/main" id="{1CD77767-1B4D-41A7-973F-7135FBE63F75}"/>
+              </a:ext>
+            </a:extLst>
+          </p:cNvPr>
+          <p:cNvSpPr>
+            <a:spLocks noGrp="1"/>
+          </p:cNvSpPr>
+          <p:nvPr>
+            <p:ph type="title"/>
+          </p:nvPr>
+        </p:nvSpPr>
+        <p:spPr>
+          <a:xfrm>
+            <a:off x="1630624" y="373023"/>
+            <a:ext cx="8930747" cy="936488"/>
+          </a:xfrm>
+        </p:spPr>
+        <p:txBody>
+          <a:bodyPr anchor="t">
+            <a:noAutofit/>
+          </a:bodyPr>
+          <a:lstStyle/>
+          <a:p>
+            <a:pPr algn="l"/>
+            <a:r>
+              <a:rPr lang="en-US" sz="2800" dirty="0"/>
+              <a:t>Topic Slide</a:t>
+            </a:r>
+          </a:p>
+        </p:txBody>
+      </p:sp>
+      <p:sp>
+        <p:nvSpPr>
+          <p:cNvPr id="3" name="Text Placeholder 2">
+            <a:extLst>
+              <a:ext uri="{FF2B5EF4-FFF2-40B4-BE49-F238E27FC236}">
+                <a16:creationId xmlns:a16="http://schemas.microsoft.com/office/drawing/2014/main" id="{23F62359-DE82-4A1D-9D06-C5B2423B7694}"/>
+              </a:ext>
+            </a:extLst>
+          </p:cNvPr>
+          <p:cNvSpPr>
+            <a:spLocks noGrp="1"/>
+          </p:cNvSpPr>
+          <p:nvPr>
+            <p:ph type="body" idx="1"/>
+          </p:nvPr>
+        </p:nvSpPr>
+        <p:spPr>
+          <a:xfrm>
+            <a:off x="1630624" y="2348089"/>
+            <a:ext cx="8930747" cy="3200400"/>
+          </a:xfrm>
+        </p:spPr>
+        <p:txBody>
+          <a:bodyPr anchor="ctr"/>
+          <a:lstStyle/>
+          <a:p>
+            <a:pPr marL="342900" indent="-342900" algn="l">
+              <a:buFont typeface="Arial" panose="020B0604020202020204" pitchFamily="34" charset="0"/>
+              <a:buChar char="•"/>
+            </a:pPr>
+            <a:r>
+              <a:rPr lang="en-US" dirty="0"/>
+              <a:t>CONTENT HERE</a:t>
+            </a:r>
+          </a:p>
+        </p:txBody>
+      </p:sp>
+    </p:spTree>
+    <p:extLst>
+      <p:ext uri="{BB962C8B-B14F-4D97-AF65-F5344CB8AC3E}">
+        <p14:creationId xmlns:p14="http://schemas.microsoft.com/office/powerpoint/2010/main" val="2639819082"/>
+      </p:ext>
+    </p:extLst>
+  </p:cSld>
+  <p:clrMapOvr>
+    <a:masterClrMapping/>
+  </p:clrMapOvr>
+</p:sld>
+</file>
+
+<file path=ppt/slides/slide16.xml><?xml version="1.0" encoding="utf-8"?>
+<p:sld xmlns:a="http://schemas.openxmlformats.org/drawingml/2006/main" xmlns:r="http://schemas.openxmlformats.org/officeDocument/2006/relationships" xmlns:p="http://schemas.openxmlformats.org/presentationml/2006/main">
+  <p:cSld>
+    <p:spTree>
+      <p:nvGrpSpPr>
+        <p:cNvPr id="1" name=""/>
+        <p:cNvGrpSpPr/>
+        <p:nvPr/>
+      </p:nvGrpSpPr>
+      <p:grpSpPr>
+        <a:xfrm>
+          <a:off x="0" y="0"/>
+          <a:ext cx="0" cy="0"/>
+          <a:chOff x="0" y="0"/>
+          <a:chExt cx="0" cy="0"/>
+        </a:xfrm>
+      </p:grpSpPr>
+      <p:sp>
+        <p:nvSpPr>
+          <p:cNvPr id="2" name="Title 1">
+            <a:extLst>
+              <a:ext uri="{FF2B5EF4-FFF2-40B4-BE49-F238E27FC236}">
+                <a16:creationId xmlns:a16="http://schemas.microsoft.com/office/drawing/2014/main" id="{DF2314C0-5399-49F6-8AD6-87EDDFF32150}"/>
+              </a:ext>
+            </a:extLst>
+          </p:cNvPr>
+          <p:cNvSpPr>
+            <a:spLocks noGrp="1"/>
+          </p:cNvSpPr>
+          <p:nvPr>
+            <p:ph type="title"/>
+          </p:nvPr>
+        </p:nvSpPr>
+        <p:spPr>
+          <a:xfrm>
+            <a:off x="1577075" y="162340"/>
+            <a:ext cx="10018713" cy="559904"/>
+          </a:xfrm>
+        </p:spPr>
+        <p:txBody>
+          <a:bodyPr>
+            <a:normAutofit/>
+          </a:bodyPr>
+          <a:lstStyle/>
+          <a:p>
+            <a:pPr algn="l"/>
+            <a:r>
+              <a:rPr lang="en-US" sz="2400" dirty="0"/>
+              <a:t>Subtitle</a:t>
+            </a:r>
+          </a:p>
+        </p:txBody>
+      </p:sp>
+      <p:sp>
+        <p:nvSpPr>
+          <p:cNvPr id="3" name="Content Placeholder 2">
+            <a:extLst>
+              <a:ext uri="{FF2B5EF4-FFF2-40B4-BE49-F238E27FC236}">
+                <a16:creationId xmlns:a16="http://schemas.microsoft.com/office/drawing/2014/main" id="{24420B42-4123-42C4-A3EE-B8CED6810E04}"/>
+              </a:ext>
+            </a:extLst>
+          </p:cNvPr>
+          <p:cNvSpPr>
+            <a:spLocks noGrp="1"/>
+          </p:cNvSpPr>
+          <p:nvPr>
+            <p:ph idx="1"/>
+          </p:nvPr>
+        </p:nvSpPr>
+        <p:spPr>
+          <a:xfrm>
+            <a:off x="1577075" y="1162877"/>
+            <a:ext cx="10018713" cy="4456045"/>
+          </a:xfrm>
+        </p:spPr>
+        <p:txBody>
+          <a:bodyPr/>
+          <a:lstStyle/>
+          <a:p>
+            <a:r>
+              <a:rPr lang="en-US" dirty="0"/>
+              <a:t>CONTENT HERE</a:t>
+            </a:r>
+          </a:p>
+        </p:txBody>
+      </p:sp>
+    </p:spTree>
+    <p:extLst>
+      <p:ext uri="{BB962C8B-B14F-4D97-AF65-F5344CB8AC3E}">
+        <p14:creationId xmlns:p14="http://schemas.microsoft.com/office/powerpoint/2010/main" val="2050461892"/>
+      </p:ext>
+    </p:extLst>
+  </p:cSld>
+  <p:clrMapOvr>
+    <a:masterClrMapping/>
+  </p:clrMapOvr>
+</p:sld>
+</file>
+
 <file path=ppt/slides/slide2.xml><?xml version="1.0" encoding="utf-8"?>
 <p:sld xmlns:a="http://schemas.openxmlformats.org/drawingml/2006/main" xmlns:r="http://schemas.openxmlformats.org/officeDocument/2006/relationships" xmlns:p="http://schemas.openxmlformats.org/presentationml/2006/main">
   <p:cSld>
@@ -6754,7 +7971,7 @@
             <a:pPr algn="l"/>
             <a:r>
               <a:rPr lang="en-US" dirty="0"/>
-              <a:t>Topic Slide</a:t>
+              <a:t>Introduction</a:t>
             </a:r>
           </a:p>
         </p:txBody>
@@ -6777,18 +7994,340 @@
         </p:nvSpPr>
         <p:spPr>
           <a:xfrm>
-            <a:off x="1630624" y="1424580"/>
-            <a:ext cx="9799376" cy="4492515"/>
+            <a:off x="1630625" y="2080426"/>
+            <a:ext cx="3834994" cy="2697147"/>
           </a:xfrm>
         </p:spPr>
         <p:txBody>
-          <a:bodyPr/>
+          <a:bodyPr anchor="ctr"/>
           <a:lstStyle/>
           <a:p>
-            <a:pPr algn="ctr"/>
+            <a:pPr marL="342900" indent="-342900" algn="l">
+              <a:buFont typeface="Arial" panose="020B0604020202020204" pitchFamily="34" charset="0"/>
+              <a:buChar char="•"/>
+            </a:pPr>
             <a:r>
               <a:rPr lang="en-US" dirty="0"/>
-              <a:t>CONTENT HERE</a:t>
+              <a:t>"Todd"</a:t>
+            </a:r>
+          </a:p>
+          <a:p>
+            <a:pPr marL="342900" indent="-342900" algn="l">
+              <a:buFont typeface="Arial" panose="020B0604020202020204" pitchFamily="34" charset="0"/>
+              <a:buChar char="•"/>
+            </a:pPr>
+            <a:r>
+              <a:rPr lang="en-US" dirty="0"/>
+              <a:t>Lives in San Diego, CA</a:t>
+            </a:r>
+          </a:p>
+          <a:p>
+            <a:pPr marL="342900" indent="-342900" algn="l">
+              <a:buFont typeface="Arial" panose="020B0604020202020204" pitchFamily="34" charset="0"/>
+              <a:buChar char="•"/>
+            </a:pPr>
+            <a:r>
+              <a:rPr lang="en-US" dirty="0"/>
+              <a:t>Enjoys rock climbing</a:t>
+            </a:r>
+          </a:p>
+          <a:p>
+            <a:pPr marL="342900" indent="-342900" algn="l">
+              <a:buFont typeface="Arial" panose="020B0604020202020204" pitchFamily="34" charset="0"/>
+              <a:buChar char="•"/>
+            </a:pPr>
+            <a:r>
+              <a:rPr lang="en-US" dirty="0"/>
+              <a:t>A foodie</a:t>
+            </a:r>
+          </a:p>
+          <a:p>
+            <a:pPr marL="342900" indent="-342900" algn="l">
+              <a:buFont typeface="Arial" panose="020B0604020202020204" pitchFamily="34" charset="0"/>
+              <a:buChar char="•"/>
+            </a:pPr>
+            <a:r>
+              <a:rPr lang="en-US" dirty="0"/>
+              <a:t>Looking to buy a new car</a:t>
+            </a:r>
+          </a:p>
+        </p:txBody>
+      </p:sp>
+      <p:sp>
+        <p:nvSpPr>
+          <p:cNvPr id="5" name="Text Placeholder 2">
+            <a:extLst>
+              <a:ext uri="{FF2B5EF4-FFF2-40B4-BE49-F238E27FC236}">
+                <a16:creationId xmlns:a16="http://schemas.microsoft.com/office/drawing/2014/main" id="{BB4720ED-45D4-463A-923C-CCD41A7AACA4}"/>
+              </a:ext>
+            </a:extLst>
+          </p:cNvPr>
+          <p:cNvSpPr txBox="1">
+            <a:spLocks/>
+          </p:cNvSpPr>
+          <p:nvPr/>
+        </p:nvSpPr>
+        <p:spPr>
+          <a:xfrm>
+            <a:off x="6726383" y="2080426"/>
+            <a:ext cx="3834994" cy="2697147"/>
+          </a:xfrm>
+          <a:prstGeom prst="rect">
+            <a:avLst/>
+          </a:prstGeom>
+        </p:spPr>
+        <p:txBody>
+          <a:bodyPr vert="horz" lIns="91440" tIns="45720" rIns="91440" bIns="45720" rtlCol="0" anchor="t">
+            <a:normAutofit/>
+          </a:bodyPr>
+          <a:lstStyle>
+            <a:lvl1pPr marL="0" indent="0" algn="r" defTabSz="457200" rtl="0" eaLnBrk="1" latinLnBrk="0" hangingPunct="1">
+              <a:spcBef>
+                <a:spcPct val="20000"/>
+              </a:spcBef>
+              <a:spcAft>
+                <a:spcPts val="600"/>
+              </a:spcAft>
+              <a:buClr>
+                <a:schemeClr val="accent1">
+                  <a:lumMod val="75000"/>
+                </a:schemeClr>
+              </a:buClr>
+              <a:buSzPct val="145000"/>
+              <a:buFont typeface="Arial"/>
+              <a:buNone/>
+              <a:defRPr sz="2000" kern="1200" cap="none">
+                <a:solidFill>
+                  <a:schemeClr val="tx1"/>
+                </a:solidFill>
+                <a:effectLst/>
+                <a:latin typeface="+mn-lt"/>
+                <a:ea typeface="+mn-ea"/>
+                <a:cs typeface="+mn-cs"/>
+              </a:defRPr>
+            </a:lvl1pPr>
+            <a:lvl2pPr marL="457200" indent="0" algn="l" defTabSz="457200" rtl="0" eaLnBrk="1" latinLnBrk="0" hangingPunct="1">
+              <a:spcBef>
+                <a:spcPct val="20000"/>
+              </a:spcBef>
+              <a:spcAft>
+                <a:spcPts val="600"/>
+              </a:spcAft>
+              <a:buClr>
+                <a:schemeClr val="accent1">
+                  <a:lumMod val="75000"/>
+                </a:schemeClr>
+              </a:buClr>
+              <a:buSzPct val="145000"/>
+              <a:buFont typeface="Arial"/>
+              <a:buNone/>
+              <a:defRPr sz="1800" kern="1200" cap="none">
+                <a:solidFill>
+                  <a:schemeClr val="tx1">
+                    <a:tint val="75000"/>
+                  </a:schemeClr>
+                </a:solidFill>
+                <a:effectLst/>
+                <a:latin typeface="+mn-lt"/>
+                <a:ea typeface="+mn-ea"/>
+                <a:cs typeface="+mn-cs"/>
+              </a:defRPr>
+            </a:lvl2pPr>
+            <a:lvl3pPr marL="914400" indent="0" algn="l" defTabSz="457200" rtl="0" eaLnBrk="1" latinLnBrk="0" hangingPunct="1">
+              <a:spcBef>
+                <a:spcPct val="20000"/>
+              </a:spcBef>
+              <a:spcAft>
+                <a:spcPts val="600"/>
+              </a:spcAft>
+              <a:buClr>
+                <a:schemeClr val="accent1">
+                  <a:lumMod val="75000"/>
+                </a:schemeClr>
+              </a:buClr>
+              <a:buSzPct val="145000"/>
+              <a:buFont typeface="Arial"/>
+              <a:buNone/>
+              <a:defRPr sz="1600" kern="1200" cap="none">
+                <a:solidFill>
+                  <a:schemeClr val="tx1">
+                    <a:tint val="75000"/>
+                  </a:schemeClr>
+                </a:solidFill>
+                <a:effectLst/>
+                <a:latin typeface="+mn-lt"/>
+                <a:ea typeface="+mn-ea"/>
+                <a:cs typeface="+mn-cs"/>
+              </a:defRPr>
+            </a:lvl3pPr>
+            <a:lvl4pPr marL="1371600" indent="0" algn="l" defTabSz="457200" rtl="0" eaLnBrk="1" latinLnBrk="0" hangingPunct="1">
+              <a:spcBef>
+                <a:spcPct val="20000"/>
+              </a:spcBef>
+              <a:spcAft>
+                <a:spcPts val="600"/>
+              </a:spcAft>
+              <a:buClr>
+                <a:schemeClr val="accent1">
+                  <a:lumMod val="75000"/>
+                </a:schemeClr>
+              </a:buClr>
+              <a:buSzPct val="145000"/>
+              <a:buFont typeface="Arial"/>
+              <a:buNone/>
+              <a:defRPr sz="1400" kern="1200" cap="none">
+                <a:solidFill>
+                  <a:schemeClr val="tx1">
+                    <a:tint val="75000"/>
+                  </a:schemeClr>
+                </a:solidFill>
+                <a:effectLst/>
+                <a:latin typeface="+mn-lt"/>
+                <a:ea typeface="+mn-ea"/>
+                <a:cs typeface="+mn-cs"/>
+              </a:defRPr>
+            </a:lvl4pPr>
+            <a:lvl5pPr marL="1828800" indent="0" algn="l" defTabSz="457200" rtl="0" eaLnBrk="1" latinLnBrk="0" hangingPunct="1">
+              <a:spcBef>
+                <a:spcPct val="20000"/>
+              </a:spcBef>
+              <a:spcAft>
+                <a:spcPts val="600"/>
+              </a:spcAft>
+              <a:buClr>
+                <a:schemeClr val="accent1">
+                  <a:lumMod val="75000"/>
+                </a:schemeClr>
+              </a:buClr>
+              <a:buSzPct val="145000"/>
+              <a:buFont typeface="Arial"/>
+              <a:buNone/>
+              <a:defRPr sz="1400" kern="1200" cap="none">
+                <a:solidFill>
+                  <a:schemeClr val="tx1">
+                    <a:tint val="75000"/>
+                  </a:schemeClr>
+                </a:solidFill>
+                <a:effectLst/>
+                <a:latin typeface="+mn-lt"/>
+                <a:ea typeface="+mn-ea"/>
+                <a:cs typeface="+mn-cs"/>
+              </a:defRPr>
+            </a:lvl5pPr>
+            <a:lvl6pPr marL="2286000" indent="0" algn="l" defTabSz="457200" rtl="0" eaLnBrk="1" latinLnBrk="0" hangingPunct="1">
+              <a:spcBef>
+                <a:spcPct val="20000"/>
+              </a:spcBef>
+              <a:spcAft>
+                <a:spcPts val="600"/>
+              </a:spcAft>
+              <a:buClr>
+                <a:schemeClr val="accent1">
+                  <a:lumMod val="75000"/>
+                </a:schemeClr>
+              </a:buClr>
+              <a:buSzPct val="145000"/>
+              <a:buFont typeface="Arial"/>
+              <a:buNone/>
+              <a:defRPr sz="1400" kern="1200" cap="none">
+                <a:solidFill>
+                  <a:schemeClr val="tx1">
+                    <a:tint val="75000"/>
+                  </a:schemeClr>
+                </a:solidFill>
+                <a:effectLst/>
+                <a:latin typeface="+mn-lt"/>
+                <a:ea typeface="+mn-ea"/>
+                <a:cs typeface="+mn-cs"/>
+              </a:defRPr>
+            </a:lvl6pPr>
+            <a:lvl7pPr marL="2743200" indent="0" algn="l" defTabSz="457200" rtl="0" eaLnBrk="1" latinLnBrk="0" hangingPunct="1">
+              <a:spcBef>
+                <a:spcPct val="20000"/>
+              </a:spcBef>
+              <a:spcAft>
+                <a:spcPts val="600"/>
+              </a:spcAft>
+              <a:buClr>
+                <a:schemeClr val="accent1">
+                  <a:lumMod val="75000"/>
+                </a:schemeClr>
+              </a:buClr>
+              <a:buSzPct val="145000"/>
+              <a:buFont typeface="Arial"/>
+              <a:buNone/>
+              <a:defRPr sz="1400" kern="1200" cap="none">
+                <a:solidFill>
+                  <a:schemeClr val="tx1">
+                    <a:tint val="75000"/>
+                  </a:schemeClr>
+                </a:solidFill>
+                <a:effectLst/>
+                <a:latin typeface="+mn-lt"/>
+                <a:ea typeface="+mn-ea"/>
+                <a:cs typeface="+mn-cs"/>
+              </a:defRPr>
+            </a:lvl7pPr>
+            <a:lvl8pPr marL="3200400" indent="0" algn="l" defTabSz="457200" rtl="0" eaLnBrk="1" latinLnBrk="0" hangingPunct="1">
+              <a:spcBef>
+                <a:spcPct val="20000"/>
+              </a:spcBef>
+              <a:spcAft>
+                <a:spcPts val="600"/>
+              </a:spcAft>
+              <a:buClr>
+                <a:schemeClr val="accent1">
+                  <a:lumMod val="75000"/>
+                </a:schemeClr>
+              </a:buClr>
+              <a:buSzPct val="145000"/>
+              <a:buFont typeface="Arial"/>
+              <a:buNone/>
+              <a:defRPr sz="1400" kern="1200" cap="none">
+                <a:solidFill>
+                  <a:schemeClr val="tx1">
+                    <a:tint val="75000"/>
+                  </a:schemeClr>
+                </a:solidFill>
+                <a:effectLst/>
+                <a:latin typeface="+mn-lt"/>
+                <a:ea typeface="+mn-ea"/>
+                <a:cs typeface="+mn-cs"/>
+              </a:defRPr>
+            </a:lvl8pPr>
+            <a:lvl9pPr marL="3657600" indent="0" algn="l" defTabSz="457200" rtl="0" eaLnBrk="1" latinLnBrk="0" hangingPunct="1">
+              <a:spcBef>
+                <a:spcPct val="20000"/>
+              </a:spcBef>
+              <a:spcAft>
+                <a:spcPts val="600"/>
+              </a:spcAft>
+              <a:buClr>
+                <a:schemeClr val="accent1">
+                  <a:lumMod val="75000"/>
+                </a:schemeClr>
+              </a:buClr>
+              <a:buSzPct val="145000"/>
+              <a:buFont typeface="Arial"/>
+              <a:buNone/>
+              <a:defRPr sz="1400" kern="1200" cap="none">
+                <a:solidFill>
+                  <a:schemeClr val="tx1">
+                    <a:tint val="75000"/>
+                  </a:schemeClr>
+                </a:solidFill>
+                <a:effectLst/>
+                <a:latin typeface="+mn-lt"/>
+                <a:ea typeface="+mn-ea"/>
+                <a:cs typeface="+mn-cs"/>
+              </a:defRPr>
+            </a:lvl9pPr>
+          </a:lstStyle>
+          <a:p>
+            <a:pPr algn="l"/>
+            <a:r>
+              <a:rPr lang="en-US" dirty="0"/>
+              <a:t>(FIND CLIPART/DRAWING/PHOTO OF RANDOM GUY AND INSERT HERE. ENSURE THE ART IS FREE USE.)</a:t>
             </a:r>
           </a:p>
         </p:txBody>
@@ -6828,7 +8367,7 @@
           <p:cNvPr id="2" name="Title 1">
             <a:extLst>
               <a:ext uri="{FF2B5EF4-FFF2-40B4-BE49-F238E27FC236}">
-                <a16:creationId xmlns:a16="http://schemas.microsoft.com/office/drawing/2014/main" id="{DF2314C0-5399-49F6-8AD6-87EDDFF32150}"/>
+                <a16:creationId xmlns:a16="http://schemas.microsoft.com/office/drawing/2014/main" id="{1CD77767-1B4D-41A7-973F-7135FBE63F75}"/>
               </a:ext>
             </a:extLst>
           </p:cNvPr>
@@ -6841,53 +8380,63 @@
         </p:nvSpPr>
         <p:spPr>
           <a:xfrm>
-            <a:off x="1577075" y="162340"/>
-            <a:ext cx="10018713" cy="559904"/>
+            <a:off x="1630625" y="536712"/>
+            <a:ext cx="8930747" cy="622852"/>
           </a:xfrm>
         </p:spPr>
         <p:txBody>
           <a:bodyPr>
+            <a:normAutofit fontScale="90000"/>
+          </a:bodyPr>
+          <a:lstStyle/>
+          <a:p>
+            <a:pPr algn="l"/>
+            <a:r>
+              <a:rPr lang="en-US" b="0" i="0" u="none" strike="noStrike" dirty="0">
+                <a:solidFill>
+                  <a:srgbClr val="000000"/>
+                </a:solidFill>
+                <a:effectLst/>
+                <a:latin typeface="docs-Calibri"/>
+              </a:rPr>
+              <a:t>Theme of the Study</a:t>
+            </a:r>
+            <a:endParaRPr lang="en-US" dirty="0"/>
+          </a:p>
+        </p:txBody>
+      </p:sp>
+      <p:sp>
+        <p:nvSpPr>
+          <p:cNvPr id="3" name="Text Placeholder 2">
+            <a:extLst>
+              <a:ext uri="{FF2B5EF4-FFF2-40B4-BE49-F238E27FC236}">
+                <a16:creationId xmlns:a16="http://schemas.microsoft.com/office/drawing/2014/main" id="{23F62359-DE82-4A1D-9D06-C5B2423B7694}"/>
+              </a:ext>
+            </a:extLst>
+          </p:cNvPr>
+          <p:cNvSpPr>
+            <a:spLocks noGrp="1"/>
+          </p:cNvSpPr>
+          <p:nvPr>
+            <p:ph type="body" idx="1"/>
+          </p:nvPr>
+        </p:nvSpPr>
+        <p:spPr>
+          <a:xfrm>
+            <a:off x="945571" y="2080426"/>
+            <a:ext cx="10300854" cy="2697147"/>
+          </a:xfrm>
+        </p:spPr>
+        <p:txBody>
+          <a:bodyPr anchor="ctr">
             <a:normAutofit/>
           </a:bodyPr>
           <a:lstStyle/>
           <a:p>
-            <a:pPr algn="l"/>
-            <a:r>
-              <a:rPr lang="en-US" sz="2400" dirty="0"/>
-              <a:t>Subtitle</a:t>
-            </a:r>
-          </a:p>
-        </p:txBody>
-      </p:sp>
-      <p:sp>
-        <p:nvSpPr>
-          <p:cNvPr id="3" name="Content Placeholder 2">
-            <a:extLst>
-              <a:ext uri="{FF2B5EF4-FFF2-40B4-BE49-F238E27FC236}">
-                <a16:creationId xmlns:a16="http://schemas.microsoft.com/office/drawing/2014/main" id="{24420B42-4123-42C4-A3EE-B8CED6810E04}"/>
-              </a:ext>
-            </a:extLst>
-          </p:cNvPr>
-          <p:cNvSpPr>
-            <a:spLocks noGrp="1"/>
-          </p:cNvSpPr>
-          <p:nvPr>
-            <p:ph idx="1"/>
-          </p:nvPr>
-        </p:nvSpPr>
-        <p:spPr>
-          <a:xfrm>
-            <a:off x="1577075" y="1162877"/>
-            <a:ext cx="10018713" cy="4456045"/>
-          </a:xfrm>
-        </p:spPr>
-        <p:txBody>
-          <a:bodyPr/>
-          <a:lstStyle/>
-          <a:p>
-            <a:r>
-              <a:rPr lang="en-US" dirty="0"/>
-              <a:t>CONTENT HERE</a:t>
+            <a:pPr algn="ctr"/>
+            <a:r>
+              <a:rPr lang="en-US" sz="4000" dirty="0"/>
+              <a:t>Should I get an electric vehicle over a gas-powered car?</a:t>
             </a:r>
           </a:p>
         </p:txBody>
@@ -6895,7 +8444,7 @@
     </p:spTree>
     <p:extLst>
       <p:ext uri="{BB962C8B-B14F-4D97-AF65-F5344CB8AC3E}">
-        <p14:creationId xmlns:p14="http://schemas.microsoft.com/office/powerpoint/2010/main" val="2917098548"/>
+        <p14:creationId xmlns:p14="http://schemas.microsoft.com/office/powerpoint/2010/main" val="390628251"/>
       </p:ext>
     </p:extLst>
   </p:cSld>
@@ -6927,7 +8476,7 @@
           <p:cNvPr id="2" name="Title 1">
             <a:extLst>
               <a:ext uri="{FF2B5EF4-FFF2-40B4-BE49-F238E27FC236}">
-                <a16:creationId xmlns:a16="http://schemas.microsoft.com/office/drawing/2014/main" id="{2B2D7A7B-92DB-4A3F-8466-5ABC67A21B0D}"/>
+                <a16:creationId xmlns:a16="http://schemas.microsoft.com/office/drawing/2014/main" id="{DF2314C0-5399-49F6-8AD6-87EDDFF32150}"/>
               </a:ext>
             </a:extLst>
           </p:cNvPr>
@@ -6935,32 +8484,39 @@
             <a:spLocks noGrp="1"/>
           </p:cNvSpPr>
           <p:nvPr>
-            <p:ph type="ctrTitle"/>
+            <p:ph type="title"/>
           </p:nvPr>
         </p:nvSpPr>
         <p:spPr>
           <a:xfrm>
-            <a:off x="5287616" y="346399"/>
-            <a:ext cx="6559963" cy="2616199"/>
+            <a:off x="1577075" y="162340"/>
+            <a:ext cx="10018713" cy="559904"/>
           </a:xfrm>
         </p:spPr>
         <p:txBody>
-          <a:bodyPr/>
+          <a:bodyPr>
+            <a:normAutofit/>
+          </a:bodyPr>
           <a:lstStyle/>
           <a:p>
-            <a:r>
-              <a:rPr lang="en-US" dirty="0"/>
-              <a:t>An Electric Craving</a:t>
-            </a:r>
-          </a:p>
-        </p:txBody>
-      </p:sp>
-      <p:sp>
-        <p:nvSpPr>
-          <p:cNvPr id="3" name="Subtitle 2">
+            <a:pPr algn="l"/>
+            <a:r>
+              <a:rPr lang="en-US" sz="1800" i="0" dirty="0">
+                <a:effectLst/>
+                <a:latin typeface="Calibri" panose="020F0502020204030204" pitchFamily="34" charset="0"/>
+              </a:rPr>
+              <a:t>EV or Gas Car?</a:t>
+            </a:r>
+            <a:endParaRPr lang="en-US" sz="2400" dirty="0"/>
+          </a:p>
+        </p:txBody>
+      </p:sp>
+      <p:sp>
+        <p:nvSpPr>
+          <p:cNvPr id="3" name="Content Placeholder 2">
             <a:extLst>
               <a:ext uri="{FF2B5EF4-FFF2-40B4-BE49-F238E27FC236}">
-                <a16:creationId xmlns:a16="http://schemas.microsoft.com/office/drawing/2014/main" id="{0C8EC36A-C5A0-4D55-89AC-D45F8CB99EFD}"/>
+                <a16:creationId xmlns:a16="http://schemas.microsoft.com/office/drawing/2014/main" id="{24420B42-4123-42C4-A3EE-B8CED6810E04}"/>
               </a:ext>
             </a:extLst>
           </p:cNvPr>
@@ -6968,13 +8524,13 @@
             <a:spLocks noGrp="1"/>
           </p:cNvSpPr>
           <p:nvPr>
-            <p:ph type="subTitle" idx="1"/>
+            <p:ph idx="1"/>
           </p:nvPr>
         </p:nvSpPr>
         <p:spPr>
           <a:xfrm>
-            <a:off x="3023220" y="3234268"/>
-            <a:ext cx="7602538" cy="946794"/>
+            <a:off x="1577075" y="1249920"/>
+            <a:ext cx="10018713" cy="4358159"/>
           </a:xfrm>
         </p:spPr>
         <p:txBody>
@@ -6983,317 +8539,31 @@
           <a:p>
             <a:r>
               <a:rPr lang="en-US" dirty="0"/>
-              <a:t>UCSD Data Science and Programming Bootcamp</a:t>
+              <a:t>Q1. Will I be able to find charging stations wherever I am?</a:t>
             </a:r>
           </a:p>
           <a:p>
             <a:r>
               <a:rPr lang="en-US" dirty="0"/>
-              <a:t>Project One</a:t>
-            </a:r>
-          </a:p>
-        </p:txBody>
-      </p:sp>
-      <p:sp>
-        <p:nvSpPr>
-          <p:cNvPr id="4" name="Subtitle 2">
-            <a:extLst>
-              <a:ext uri="{FF2B5EF4-FFF2-40B4-BE49-F238E27FC236}">
-                <a16:creationId xmlns:a16="http://schemas.microsoft.com/office/drawing/2014/main" id="{259DCBD9-1703-4781-90FC-990623A8C6CA}"/>
-              </a:ext>
-            </a:extLst>
-          </p:cNvPr>
-          <p:cNvSpPr txBox="1">
-            <a:spLocks/>
-          </p:cNvSpPr>
-          <p:nvPr/>
-        </p:nvSpPr>
-        <p:spPr>
-          <a:xfrm>
-            <a:off x="8942596" y="4228181"/>
-            <a:ext cx="1683162" cy="1430497"/>
-          </a:xfrm>
-          <a:prstGeom prst="rect">
-            <a:avLst/>
-          </a:prstGeom>
-        </p:spPr>
-        <p:txBody>
-          <a:bodyPr vert="horz" lIns="91440" tIns="45720" rIns="91440" bIns="45720" rtlCol="0" anchor="t">
-            <a:noAutofit/>
-          </a:bodyPr>
-          <a:lstStyle>
-            <a:lvl1pPr marL="0" indent="0" algn="r" defTabSz="457200" rtl="0" eaLnBrk="1" latinLnBrk="0" hangingPunct="1">
-              <a:spcBef>
-                <a:spcPct val="20000"/>
-              </a:spcBef>
-              <a:spcAft>
-                <a:spcPts val="600"/>
-              </a:spcAft>
-              <a:buClr>
-                <a:schemeClr val="accent1">
-                  <a:lumMod val="75000"/>
-                </a:schemeClr>
-              </a:buClr>
-              <a:buSzPct val="145000"/>
-              <a:buFont typeface="Arial"/>
-              <a:buNone/>
-              <a:defRPr sz="2100" kern="1200" cap="none">
-                <a:solidFill>
-                  <a:schemeClr val="tx1"/>
-                </a:solidFill>
-                <a:effectLst/>
-                <a:latin typeface="+mn-lt"/>
-                <a:ea typeface="+mn-ea"/>
-                <a:cs typeface="+mn-cs"/>
-              </a:defRPr>
-            </a:lvl1pPr>
-            <a:lvl2pPr marL="457200" indent="0" algn="ctr" defTabSz="457200" rtl="0" eaLnBrk="1" latinLnBrk="0" hangingPunct="1">
-              <a:spcBef>
-                <a:spcPct val="20000"/>
-              </a:spcBef>
-              <a:spcAft>
-                <a:spcPts val="600"/>
-              </a:spcAft>
-              <a:buClr>
-                <a:schemeClr val="accent1">
-                  <a:lumMod val="75000"/>
-                </a:schemeClr>
-              </a:buClr>
-              <a:buSzPct val="145000"/>
-              <a:buFont typeface="Arial"/>
-              <a:buNone/>
-              <a:defRPr sz="2000" kern="1200" cap="none">
-                <a:solidFill>
-                  <a:schemeClr val="tx1">
-                    <a:tint val="75000"/>
-                  </a:schemeClr>
-                </a:solidFill>
-                <a:effectLst/>
-                <a:latin typeface="+mn-lt"/>
-                <a:ea typeface="+mn-ea"/>
-                <a:cs typeface="+mn-cs"/>
-              </a:defRPr>
-            </a:lvl2pPr>
-            <a:lvl3pPr marL="914400" indent="0" algn="ctr" defTabSz="457200" rtl="0" eaLnBrk="1" latinLnBrk="0" hangingPunct="1">
-              <a:spcBef>
-                <a:spcPct val="20000"/>
-              </a:spcBef>
-              <a:spcAft>
-                <a:spcPts val="600"/>
-              </a:spcAft>
-              <a:buClr>
-                <a:schemeClr val="accent1">
-                  <a:lumMod val="75000"/>
-                </a:schemeClr>
-              </a:buClr>
-              <a:buSzPct val="145000"/>
-              <a:buFont typeface="Arial"/>
-              <a:buNone/>
-              <a:defRPr sz="1800" kern="1200" cap="none">
-                <a:solidFill>
-                  <a:schemeClr val="tx1">
-                    <a:tint val="75000"/>
-                  </a:schemeClr>
-                </a:solidFill>
-                <a:effectLst/>
-                <a:latin typeface="+mn-lt"/>
-                <a:ea typeface="+mn-ea"/>
-                <a:cs typeface="+mn-cs"/>
-              </a:defRPr>
-            </a:lvl3pPr>
-            <a:lvl4pPr marL="1371600" indent="0" algn="ctr" defTabSz="457200" rtl="0" eaLnBrk="1" latinLnBrk="0" hangingPunct="1">
-              <a:spcBef>
-                <a:spcPct val="20000"/>
-              </a:spcBef>
-              <a:spcAft>
-                <a:spcPts val="600"/>
-              </a:spcAft>
-              <a:buClr>
-                <a:schemeClr val="accent1">
-                  <a:lumMod val="75000"/>
-                </a:schemeClr>
-              </a:buClr>
-              <a:buSzPct val="145000"/>
-              <a:buFont typeface="Arial"/>
-              <a:buNone/>
-              <a:defRPr sz="1600" kern="1200" cap="none">
-                <a:solidFill>
-                  <a:schemeClr val="tx1">
-                    <a:tint val="75000"/>
-                  </a:schemeClr>
-                </a:solidFill>
-                <a:effectLst/>
-                <a:latin typeface="+mn-lt"/>
-                <a:ea typeface="+mn-ea"/>
-                <a:cs typeface="+mn-cs"/>
-              </a:defRPr>
-            </a:lvl4pPr>
-            <a:lvl5pPr marL="1828800" indent="0" algn="ctr" defTabSz="457200" rtl="0" eaLnBrk="1" latinLnBrk="0" hangingPunct="1">
-              <a:spcBef>
-                <a:spcPct val="20000"/>
-              </a:spcBef>
-              <a:spcAft>
-                <a:spcPts val="600"/>
-              </a:spcAft>
-              <a:buClr>
-                <a:schemeClr val="accent1">
-                  <a:lumMod val="75000"/>
-                </a:schemeClr>
-              </a:buClr>
-              <a:buSzPct val="145000"/>
-              <a:buFont typeface="Arial"/>
-              <a:buNone/>
-              <a:defRPr sz="1400" kern="1200" cap="none">
-                <a:solidFill>
-                  <a:schemeClr val="tx1">
-                    <a:tint val="75000"/>
-                  </a:schemeClr>
-                </a:solidFill>
-                <a:effectLst/>
-                <a:latin typeface="+mn-lt"/>
-                <a:ea typeface="+mn-ea"/>
-                <a:cs typeface="+mn-cs"/>
-              </a:defRPr>
-            </a:lvl5pPr>
-            <a:lvl6pPr marL="2286000" indent="0" algn="ctr" defTabSz="457200" rtl="0" eaLnBrk="1" latinLnBrk="0" hangingPunct="1">
-              <a:spcBef>
-                <a:spcPct val="20000"/>
-              </a:spcBef>
-              <a:spcAft>
-                <a:spcPts val="600"/>
-              </a:spcAft>
-              <a:buClr>
-                <a:schemeClr val="accent1">
-                  <a:lumMod val="75000"/>
-                </a:schemeClr>
-              </a:buClr>
-              <a:buSzPct val="145000"/>
-              <a:buFont typeface="Arial"/>
-              <a:buNone/>
-              <a:defRPr sz="1400" kern="1200" cap="none">
-                <a:solidFill>
-                  <a:schemeClr val="tx1">
-                    <a:tint val="75000"/>
-                  </a:schemeClr>
-                </a:solidFill>
-                <a:effectLst/>
-                <a:latin typeface="+mn-lt"/>
-                <a:ea typeface="+mn-ea"/>
-                <a:cs typeface="+mn-cs"/>
-              </a:defRPr>
-            </a:lvl6pPr>
-            <a:lvl7pPr marL="2743200" indent="0" algn="ctr" defTabSz="457200" rtl="0" eaLnBrk="1" latinLnBrk="0" hangingPunct="1">
-              <a:spcBef>
-                <a:spcPct val="20000"/>
-              </a:spcBef>
-              <a:spcAft>
-                <a:spcPts val="600"/>
-              </a:spcAft>
-              <a:buClr>
-                <a:schemeClr val="accent1">
-                  <a:lumMod val="75000"/>
-                </a:schemeClr>
-              </a:buClr>
-              <a:buSzPct val="145000"/>
-              <a:buFont typeface="Arial"/>
-              <a:buNone/>
-              <a:defRPr sz="1400" kern="1200" cap="none">
-                <a:solidFill>
-                  <a:schemeClr val="tx1">
-                    <a:tint val="75000"/>
-                  </a:schemeClr>
-                </a:solidFill>
-                <a:effectLst/>
-                <a:latin typeface="+mn-lt"/>
-                <a:ea typeface="+mn-ea"/>
-                <a:cs typeface="+mn-cs"/>
-              </a:defRPr>
-            </a:lvl7pPr>
-            <a:lvl8pPr marL="3200400" indent="0" algn="ctr" defTabSz="457200" rtl="0" eaLnBrk="1" latinLnBrk="0" hangingPunct="1">
-              <a:spcBef>
-                <a:spcPct val="20000"/>
-              </a:spcBef>
-              <a:spcAft>
-                <a:spcPts val="600"/>
-              </a:spcAft>
-              <a:buClr>
-                <a:schemeClr val="accent1">
-                  <a:lumMod val="75000"/>
-                </a:schemeClr>
-              </a:buClr>
-              <a:buSzPct val="145000"/>
-              <a:buFont typeface="Arial"/>
-              <a:buNone/>
-              <a:defRPr sz="1400" kern="1200" cap="none">
-                <a:solidFill>
-                  <a:schemeClr val="tx1">
-                    <a:tint val="75000"/>
-                  </a:schemeClr>
-                </a:solidFill>
-                <a:effectLst/>
-                <a:latin typeface="+mn-lt"/>
-                <a:ea typeface="+mn-ea"/>
-                <a:cs typeface="+mn-cs"/>
-              </a:defRPr>
-            </a:lvl8pPr>
-            <a:lvl9pPr marL="3657600" indent="0" algn="ctr" defTabSz="457200" rtl="0" eaLnBrk="1" latinLnBrk="0" hangingPunct="1">
-              <a:spcBef>
-                <a:spcPct val="20000"/>
-              </a:spcBef>
-              <a:spcAft>
-                <a:spcPts val="600"/>
-              </a:spcAft>
-              <a:buClr>
-                <a:schemeClr val="accent1">
-                  <a:lumMod val="75000"/>
-                </a:schemeClr>
-              </a:buClr>
-              <a:buSzPct val="145000"/>
-              <a:buFont typeface="Arial"/>
-              <a:buNone/>
-              <a:defRPr sz="1400" kern="1200" cap="none">
-                <a:solidFill>
-                  <a:schemeClr val="tx1">
-                    <a:tint val="75000"/>
-                  </a:schemeClr>
-                </a:solidFill>
-                <a:effectLst/>
-                <a:latin typeface="+mn-lt"/>
-                <a:ea typeface="+mn-ea"/>
-                <a:cs typeface="+mn-cs"/>
-              </a:defRPr>
-            </a:lvl9pPr>
-          </a:lstStyle>
-          <a:p>
-            <a:r>
-              <a:rPr lang="en-US" sz="1400" dirty="0"/>
-              <a:t>Jacob Zacarias</a:t>
-            </a:r>
-          </a:p>
-          <a:p>
-            <a:r>
-              <a:rPr lang="en-US" sz="1400" dirty="0" err="1"/>
-              <a:t>Tanlin</a:t>
-            </a:r>
-            <a:r>
-              <a:rPr lang="en-US" sz="1400" dirty="0"/>
-              <a:t> Hung</a:t>
-            </a:r>
-          </a:p>
-          <a:p>
-            <a:r>
-              <a:rPr lang="en-US" sz="1400" dirty="0"/>
-              <a:t>Sanabu Washizuka</a:t>
-            </a:r>
-          </a:p>
-          <a:p>
-            <a:r>
-              <a:rPr lang="en-US" sz="1400" dirty="0" err="1"/>
-              <a:t>Walaa</a:t>
-            </a:r>
-            <a:r>
-              <a:rPr lang="en-US" sz="1400" dirty="0"/>
-              <a:t> Alani</a:t>
+              <a:t>Q2. Out of both categories (EVs and gas-powered cars) which make and model is the most cost-effective for their fuel?</a:t>
+            </a:r>
+          </a:p>
+          <a:p>
+            <a:r>
+              <a:rPr lang="en-US" dirty="0"/>
+              <a:t>Q3. Will EVs really pay themselves off?</a:t>
+            </a:r>
+          </a:p>
+          <a:p>
+            <a:r>
+              <a:rPr lang="en-US" dirty="0"/>
+              <a:t>Q4. What factors might hint that a city has a lot of charging stations?</a:t>
+            </a:r>
+          </a:p>
+          <a:p>
+            <a:r>
+              <a:rPr lang="en-US" dirty="0"/>
+              <a:t>Q5. How much will I save on a trip?</a:t>
             </a:r>
           </a:p>
         </p:txBody>
@@ -7301,7 +8571,7 @@
     </p:spTree>
     <p:extLst>
       <p:ext uri="{BB962C8B-B14F-4D97-AF65-F5344CB8AC3E}">
-        <p14:creationId xmlns:p14="http://schemas.microsoft.com/office/powerpoint/2010/main" val="3822797522"/>
+        <p14:creationId xmlns:p14="http://schemas.microsoft.com/office/powerpoint/2010/main" val="2917098548"/>
       </p:ext>
     </p:extLst>
   </p:cSld>
@@ -7333,7 +8603,7 @@
           <p:cNvPr id="2" name="Title 1">
             <a:extLst>
               <a:ext uri="{FF2B5EF4-FFF2-40B4-BE49-F238E27FC236}">
-                <a16:creationId xmlns:a16="http://schemas.microsoft.com/office/drawing/2014/main" id="{1CD77767-1B4D-41A7-973F-7135FBE63F75}"/>
+                <a16:creationId xmlns:a16="http://schemas.microsoft.com/office/drawing/2014/main" id="{DF2314C0-5399-49F6-8AD6-87EDDFF32150}"/>
               </a:ext>
             </a:extLst>
           </p:cNvPr>
@@ -7346,30 +8616,34 @@
         </p:nvSpPr>
         <p:spPr>
           <a:xfrm>
-            <a:off x="1630625" y="536712"/>
-            <a:ext cx="8930747" cy="622852"/>
+            <a:off x="1577075" y="162340"/>
+            <a:ext cx="10018713" cy="559904"/>
           </a:xfrm>
         </p:spPr>
         <p:txBody>
           <a:bodyPr>
-            <a:normAutofit fontScale="90000"/>
+            <a:normAutofit/>
           </a:bodyPr>
           <a:lstStyle/>
           <a:p>
             <a:pPr algn="l"/>
             <a:r>
-              <a:rPr lang="en-US" dirty="0"/>
-              <a:t>Topic Slide</a:t>
-            </a:r>
-          </a:p>
-        </p:txBody>
-      </p:sp>
-      <p:sp>
-        <p:nvSpPr>
-          <p:cNvPr id="3" name="Text Placeholder 2">
+              <a:rPr lang="en-US" sz="1800" i="0" dirty="0">
+                <a:effectLst/>
+                <a:latin typeface="Calibri" panose="020F0502020204030204" pitchFamily="34" charset="0"/>
+              </a:rPr>
+              <a:t>Brief Summary of findings</a:t>
+            </a:r>
+            <a:endParaRPr lang="en-US" sz="2400" dirty="0"/>
+          </a:p>
+        </p:txBody>
+      </p:sp>
+      <p:sp>
+        <p:nvSpPr>
+          <p:cNvPr id="3" name="Content Placeholder 2">
             <a:extLst>
               <a:ext uri="{FF2B5EF4-FFF2-40B4-BE49-F238E27FC236}">
-                <a16:creationId xmlns:a16="http://schemas.microsoft.com/office/drawing/2014/main" id="{23F62359-DE82-4A1D-9D06-C5B2423B7694}"/>
+                <a16:creationId xmlns:a16="http://schemas.microsoft.com/office/drawing/2014/main" id="{24420B42-4123-42C4-A3EE-B8CED6810E04}"/>
               </a:ext>
             </a:extLst>
           </p:cNvPr>
@@ -7377,23 +8651,83 @@
             <a:spLocks noGrp="1"/>
           </p:cNvSpPr>
           <p:nvPr>
-            <p:ph type="body" idx="1"/>
+            <p:ph idx="1"/>
           </p:nvPr>
         </p:nvSpPr>
         <p:spPr>
           <a:xfrm>
-            <a:off x="1630624" y="1424580"/>
-            <a:ext cx="9799376" cy="4492515"/>
+            <a:off x="1577075" y="1249920"/>
+            <a:ext cx="10018713" cy="4358159"/>
           </a:xfrm>
         </p:spPr>
         <p:txBody>
-          <a:bodyPr/>
+          <a:bodyPr>
+            <a:normAutofit fontScale="92500" lnSpcReduction="20000"/>
+          </a:bodyPr>
           <a:lstStyle/>
           <a:p>
-            <a:pPr algn="ctr"/>
             <a:r>
               <a:rPr lang="en-US" dirty="0"/>
-              <a:t>CONTENT HERE</a:t>
+              <a:t>Q1. Will I be able to find charging stations wherever I am?</a:t>
+            </a:r>
+          </a:p>
+          <a:p>
+            <a:pPr lvl="1"/>
+            <a:r>
+              <a:rPr lang="en-US" dirty="0"/>
+              <a:t>(summary here?)</a:t>
+            </a:r>
+          </a:p>
+          <a:p>
+            <a:r>
+              <a:rPr lang="en-US" dirty="0"/>
+              <a:t>Q2. Out of both categories (EVs and gas-powered cars) which make and model is the most cost-effective for their fuel?</a:t>
+            </a:r>
+          </a:p>
+          <a:p>
+            <a:pPr lvl="1"/>
+            <a:r>
+              <a:rPr lang="en-US" dirty="0"/>
+              <a:t>(summary here?)</a:t>
+            </a:r>
+          </a:p>
+          <a:p>
+            <a:r>
+              <a:rPr lang="en-US" dirty="0"/>
+              <a:t>Q3. Will EVs really pay themselves off?</a:t>
+            </a:r>
+          </a:p>
+          <a:p>
+            <a:pPr lvl="1"/>
+            <a:r>
+              <a:rPr lang="en-US" dirty="0"/>
+              <a:t>(summary here?)</a:t>
+            </a:r>
+          </a:p>
+          <a:p>
+            <a:r>
+              <a:rPr lang="en-US" dirty="0"/>
+              <a:t>Q4. What factors might hint that a city has a lot of charging stations?</a:t>
+            </a:r>
+          </a:p>
+          <a:p>
+            <a:pPr lvl="1"/>
+            <a:r>
+              <a:rPr lang="en-US" dirty="0"/>
+              <a:t>(summary here?)</a:t>
+            </a:r>
+          </a:p>
+          <a:p>
+            <a:r>
+              <a:rPr lang="en-US" dirty="0"/>
+              <a:t>Q5. How much will I save on a trip?</a:t>
+            </a:r>
+          </a:p>
+          <a:p>
+            <a:pPr lvl="1"/>
+            <a:r>
+              <a:rPr lang="en-US" dirty="0"/>
+              <a:t>(summary here?)</a:t>
             </a:r>
           </a:p>
         </p:txBody>
@@ -7401,7 +8735,7 @@
     </p:spTree>
     <p:extLst>
       <p:ext uri="{BB962C8B-B14F-4D97-AF65-F5344CB8AC3E}">
-        <p14:creationId xmlns:p14="http://schemas.microsoft.com/office/powerpoint/2010/main" val="375406073"/>
+        <p14:creationId xmlns:p14="http://schemas.microsoft.com/office/powerpoint/2010/main" val="1083437823"/>
       </p:ext>
     </p:extLst>
   </p:cSld>
@@ -7433,6 +8767,119 @@
           <p:cNvPr id="2" name="Title 1">
             <a:extLst>
               <a:ext uri="{FF2B5EF4-FFF2-40B4-BE49-F238E27FC236}">
+                <a16:creationId xmlns:a16="http://schemas.microsoft.com/office/drawing/2014/main" id="{1CD77767-1B4D-41A7-973F-7135FBE63F75}"/>
+              </a:ext>
+            </a:extLst>
+          </p:cNvPr>
+          <p:cNvSpPr>
+            <a:spLocks noGrp="1"/>
+          </p:cNvSpPr>
+          <p:nvPr>
+            <p:ph type="title"/>
+          </p:nvPr>
+        </p:nvSpPr>
+        <p:spPr>
+          <a:xfrm>
+            <a:off x="1630624" y="373023"/>
+            <a:ext cx="8930747" cy="936488"/>
+          </a:xfrm>
+        </p:spPr>
+        <p:txBody>
+          <a:bodyPr anchor="t">
+            <a:noAutofit/>
+          </a:bodyPr>
+          <a:lstStyle/>
+          <a:p>
+            <a:pPr algn="l"/>
+            <a:r>
+              <a:rPr lang="en-US" sz="2800" dirty="0"/>
+              <a:t>Q.4 What factors might hint that a city has plentiful charging stations?</a:t>
+            </a:r>
+          </a:p>
+        </p:txBody>
+      </p:sp>
+      <p:sp>
+        <p:nvSpPr>
+          <p:cNvPr id="3" name="Text Placeholder 2">
+            <a:extLst>
+              <a:ext uri="{FF2B5EF4-FFF2-40B4-BE49-F238E27FC236}">
+                <a16:creationId xmlns:a16="http://schemas.microsoft.com/office/drawing/2014/main" id="{23F62359-DE82-4A1D-9D06-C5B2423B7694}"/>
+              </a:ext>
+            </a:extLst>
+          </p:cNvPr>
+          <p:cNvSpPr>
+            <a:spLocks noGrp="1"/>
+          </p:cNvSpPr>
+          <p:nvPr>
+            <p:ph type="body" idx="1"/>
+          </p:nvPr>
+        </p:nvSpPr>
+        <p:spPr>
+          <a:xfrm>
+            <a:off x="1630624" y="2348089"/>
+            <a:ext cx="8930747" cy="3200400"/>
+          </a:xfrm>
+        </p:spPr>
+        <p:txBody>
+          <a:bodyPr/>
+          <a:lstStyle/>
+          <a:p>
+            <a:pPr marL="342900" indent="-342900" algn="l">
+              <a:buFont typeface="Arial" panose="020B0604020202020204" pitchFamily="34" charset="0"/>
+              <a:buChar char="•"/>
+            </a:pPr>
+            <a:r>
+              <a:rPr lang="en-US" dirty="0"/>
+              <a:t>"If I were to move or travel elsewhere, what factors could I look at to see how reliably I can find a charge station?"</a:t>
+            </a:r>
+          </a:p>
+          <a:p>
+            <a:pPr marL="342900" indent="-342900" algn="l">
+              <a:buFont typeface="Arial" panose="020B0604020202020204" pitchFamily="34" charset="0"/>
+              <a:buChar char="•"/>
+            </a:pPr>
+            <a:r>
+              <a:rPr lang="en-US" dirty="0"/>
+              <a:t>In other words, what properties of a city correlates with how many charge stations are available there?</a:t>
+            </a:r>
+          </a:p>
+        </p:txBody>
+      </p:sp>
+    </p:spTree>
+    <p:extLst>
+      <p:ext uri="{BB962C8B-B14F-4D97-AF65-F5344CB8AC3E}">
+        <p14:creationId xmlns:p14="http://schemas.microsoft.com/office/powerpoint/2010/main" val="118216430"/>
+      </p:ext>
+    </p:extLst>
+  </p:cSld>
+  <p:clrMapOvr>
+    <a:masterClrMapping/>
+  </p:clrMapOvr>
+</p:sld>
+</file>
+
+<file path=ppt/slides/slide7.xml><?xml version="1.0" encoding="utf-8"?>
+<p:sld xmlns:a="http://schemas.openxmlformats.org/drawingml/2006/main" xmlns:r="http://schemas.openxmlformats.org/officeDocument/2006/relationships" xmlns:p="http://schemas.openxmlformats.org/presentationml/2006/main">
+  <p:cSld>
+    <p:spTree>
+      <p:nvGrpSpPr>
+        <p:cNvPr id="1" name=""/>
+        <p:cNvGrpSpPr/>
+        <p:nvPr/>
+      </p:nvGrpSpPr>
+      <p:grpSpPr>
+        <a:xfrm>
+          <a:off x="0" y="0"/>
+          <a:ext cx="0" cy="0"/>
+          <a:chOff x="0" y="0"/>
+          <a:chExt cx="0" cy="0"/>
+        </a:xfrm>
+      </p:grpSpPr>
+      <p:sp>
+        <p:nvSpPr>
+          <p:cNvPr id="2" name="Title 1">
+            <a:extLst>
+              <a:ext uri="{FF2B5EF4-FFF2-40B4-BE49-F238E27FC236}">
                 <a16:creationId xmlns:a16="http://schemas.microsoft.com/office/drawing/2014/main" id="{DF2314C0-5399-49F6-8AD6-87EDDFF32150}"/>
               </a:ext>
             </a:extLst>
@@ -7459,7 +8906,7 @@
             <a:pPr algn="l"/>
             <a:r>
               <a:rPr lang="en-US" sz="2400" dirty="0"/>
-              <a:t>Subtitle</a:t>
+              <a:t>Q.4 Correlational Study</a:t>
             </a:r>
           </a:p>
         </p:txBody>
@@ -7492,7 +8939,53 @@
           <a:p>
             <a:r>
               <a:rPr lang="en-US" dirty="0"/>
-              <a:t>CONTENT HERE</a:t>
+              <a:t>Correlational Study of the "No. of Charge Stations" against other factors within a city</a:t>
+            </a:r>
+          </a:p>
+          <a:p>
+            <a:r>
+              <a:rPr lang="en-US" dirty="0"/>
+              <a:t>Review "No. of Charge Stations" against :</a:t>
+            </a:r>
+          </a:p>
+          <a:p>
+            <a:pPr marL="457200" indent="-457200">
+              <a:buFont typeface="+mj-lt"/>
+              <a:buAutoNum type="arabicPeriod"/>
+            </a:pPr>
+            <a:r>
+              <a:rPr lang="en-US" dirty="0"/>
+              <a:t>City Population Density</a:t>
+            </a:r>
+          </a:p>
+          <a:p>
+            <a:pPr marL="457200" indent="-457200">
+              <a:buFont typeface="+mj-lt"/>
+              <a:buAutoNum type="arabicPeriod"/>
+            </a:pPr>
+            <a:r>
+              <a:rPr lang="en-US" dirty="0"/>
+              <a:t>Gas Prices (CA only study)</a:t>
+            </a:r>
+          </a:p>
+          <a:p>
+            <a:pPr marL="457200" indent="-457200">
+              <a:buFont typeface="+mj-lt"/>
+              <a:buAutoNum type="arabicPeriod"/>
+            </a:pPr>
+            <a:r>
+              <a:rPr lang="en-US" dirty="0"/>
+              <a:t>Institution type 1 (to be named later)</a:t>
+            </a:r>
+          </a:p>
+          <a:p>
+            <a:pPr marL="457200" indent="-457200">
+              <a:buFont typeface="+mj-lt"/>
+              <a:buAutoNum type="arabicPeriod"/>
+            </a:pPr>
+            <a:r>
+              <a:rPr lang="en-US" dirty="0"/>
+              <a:t>Institution type 2 (to be named later)</a:t>
             </a:r>
           </a:p>
         </p:txBody>
@@ -7500,7 +8993,261 @@
     </p:spTree>
     <p:extLst>
       <p:ext uri="{BB962C8B-B14F-4D97-AF65-F5344CB8AC3E}">
-        <p14:creationId xmlns:p14="http://schemas.microsoft.com/office/powerpoint/2010/main" val="2050461892"/>
+        <p14:creationId xmlns:p14="http://schemas.microsoft.com/office/powerpoint/2010/main" val="1635095999"/>
+      </p:ext>
+    </p:extLst>
+  </p:cSld>
+  <p:clrMapOvr>
+    <a:masterClrMapping/>
+  </p:clrMapOvr>
+</p:sld>
+</file>
+
+<file path=ppt/slides/slide8.xml><?xml version="1.0" encoding="utf-8"?>
+<p:sld xmlns:a="http://schemas.openxmlformats.org/drawingml/2006/main" xmlns:r="http://schemas.openxmlformats.org/officeDocument/2006/relationships" xmlns:p="http://schemas.openxmlformats.org/presentationml/2006/main">
+  <p:cSld>
+    <p:spTree>
+      <p:nvGrpSpPr>
+        <p:cNvPr id="1" name=""/>
+        <p:cNvGrpSpPr/>
+        <p:nvPr/>
+      </p:nvGrpSpPr>
+      <p:grpSpPr>
+        <a:xfrm>
+          <a:off x="0" y="0"/>
+          <a:ext cx="0" cy="0"/>
+          <a:chOff x="0" y="0"/>
+          <a:chExt cx="0" cy="0"/>
+        </a:xfrm>
+      </p:grpSpPr>
+      <p:sp>
+        <p:nvSpPr>
+          <p:cNvPr id="2" name="Title 1">
+            <a:extLst>
+              <a:ext uri="{FF2B5EF4-FFF2-40B4-BE49-F238E27FC236}">
+                <a16:creationId xmlns:a16="http://schemas.microsoft.com/office/drawing/2014/main" id="{DF2314C0-5399-49F6-8AD6-87EDDFF32150}"/>
+              </a:ext>
+            </a:extLst>
+          </p:cNvPr>
+          <p:cNvSpPr>
+            <a:spLocks noGrp="1"/>
+          </p:cNvSpPr>
+          <p:nvPr>
+            <p:ph type="title"/>
+          </p:nvPr>
+        </p:nvSpPr>
+        <p:spPr>
+          <a:xfrm>
+            <a:off x="1577075" y="162340"/>
+            <a:ext cx="10018713" cy="559904"/>
+          </a:xfrm>
+        </p:spPr>
+        <p:txBody>
+          <a:bodyPr>
+            <a:normAutofit/>
+          </a:bodyPr>
+          <a:lstStyle/>
+          <a:p>
+            <a:pPr algn="l"/>
+            <a:r>
+              <a:rPr lang="en-US" sz="2400" dirty="0"/>
+              <a:t>Q.4.1 – Charging Station List</a:t>
+            </a:r>
+          </a:p>
+        </p:txBody>
+      </p:sp>
+      <p:pic>
+        <p:nvPicPr>
+          <p:cNvPr id="4" name="Picture 3">
+            <a:extLst>
+              <a:ext uri="{FF2B5EF4-FFF2-40B4-BE49-F238E27FC236}">
+                <a16:creationId xmlns:a16="http://schemas.microsoft.com/office/drawing/2014/main" id="{EEF3CB3E-15C8-40E6-8E6E-9CCA702A56DC}"/>
+              </a:ext>
+            </a:extLst>
+          </p:cNvPr>
+          <p:cNvPicPr>
+            <a:picLocks noChangeAspect="1"/>
+          </p:cNvPicPr>
+          <p:nvPr/>
+        </p:nvPicPr>
+        <p:blipFill>
+          <a:blip r:embed="rId2">
+            <a:extLst>
+              <a:ext uri="{28A0092B-C50C-407E-A947-70E740481C1C}">
+                <a14:useLocalDpi xmlns:a14="http://schemas.microsoft.com/office/drawing/2010/main" val="0"/>
+              </a:ext>
+            </a:extLst>
+          </a:blip>
+          <a:stretch>
+            <a:fillRect/>
+          </a:stretch>
+        </p:blipFill>
+        <p:spPr>
+          <a:xfrm>
+            <a:off x="1577075" y="2138353"/>
+            <a:ext cx="9229792" cy="2581294"/>
+          </a:xfrm>
+          <a:prstGeom prst="rect">
+            <a:avLst/>
+          </a:prstGeom>
+        </p:spPr>
+      </p:pic>
+    </p:spTree>
+    <p:extLst>
+      <p:ext uri="{BB962C8B-B14F-4D97-AF65-F5344CB8AC3E}">
+        <p14:creationId xmlns:p14="http://schemas.microsoft.com/office/powerpoint/2010/main" val="804357047"/>
+      </p:ext>
+    </p:extLst>
+  </p:cSld>
+  <p:clrMapOvr>
+    <a:masterClrMapping/>
+  </p:clrMapOvr>
+</p:sld>
+</file>
+
+<file path=ppt/slides/slide9.xml><?xml version="1.0" encoding="utf-8"?>
+<p:sld xmlns:a="http://schemas.openxmlformats.org/drawingml/2006/main" xmlns:r="http://schemas.openxmlformats.org/officeDocument/2006/relationships" xmlns:p="http://schemas.openxmlformats.org/presentationml/2006/main">
+  <p:cSld>
+    <p:spTree>
+      <p:nvGrpSpPr>
+        <p:cNvPr id="1" name=""/>
+        <p:cNvGrpSpPr/>
+        <p:nvPr/>
+      </p:nvGrpSpPr>
+      <p:grpSpPr>
+        <a:xfrm>
+          <a:off x="0" y="0"/>
+          <a:ext cx="0" cy="0"/>
+          <a:chOff x="0" y="0"/>
+          <a:chExt cx="0" cy="0"/>
+        </a:xfrm>
+      </p:grpSpPr>
+      <p:sp>
+        <p:nvSpPr>
+          <p:cNvPr id="2" name="Title 1">
+            <a:extLst>
+              <a:ext uri="{FF2B5EF4-FFF2-40B4-BE49-F238E27FC236}">
+                <a16:creationId xmlns:a16="http://schemas.microsoft.com/office/drawing/2014/main" id="{DF2314C0-5399-49F6-8AD6-87EDDFF32150}"/>
+              </a:ext>
+            </a:extLst>
+          </p:cNvPr>
+          <p:cNvSpPr>
+            <a:spLocks noGrp="1"/>
+          </p:cNvSpPr>
+          <p:nvPr>
+            <p:ph type="title"/>
+          </p:nvPr>
+        </p:nvSpPr>
+        <p:spPr>
+          <a:xfrm>
+            <a:off x="1577075" y="162340"/>
+            <a:ext cx="10018713" cy="559904"/>
+          </a:xfrm>
+        </p:spPr>
+        <p:txBody>
+          <a:bodyPr>
+            <a:normAutofit/>
+          </a:bodyPr>
+          <a:lstStyle/>
+          <a:p>
+            <a:pPr algn="l"/>
+            <a:r>
+              <a:rPr lang="en-US" sz="2400" dirty="0"/>
+              <a:t>Q.4.1 - City List and City Population Density (cleaning)</a:t>
+            </a:r>
+          </a:p>
+        </p:txBody>
+      </p:sp>
+      <p:sp>
+        <p:nvSpPr>
+          <p:cNvPr id="3" name="Content Placeholder 2">
+            <a:extLst>
+              <a:ext uri="{FF2B5EF4-FFF2-40B4-BE49-F238E27FC236}">
+                <a16:creationId xmlns:a16="http://schemas.microsoft.com/office/drawing/2014/main" id="{24420B42-4123-42C4-A3EE-B8CED6810E04}"/>
+              </a:ext>
+            </a:extLst>
+          </p:cNvPr>
+          <p:cNvSpPr>
+            <a:spLocks noGrp="1"/>
+          </p:cNvSpPr>
+          <p:nvPr>
+            <p:ph idx="1"/>
+          </p:nvPr>
+        </p:nvSpPr>
+        <p:spPr>
+          <a:xfrm>
+            <a:off x="1653275" y="2003500"/>
+            <a:ext cx="8502107" cy="2851000"/>
+          </a:xfrm>
+        </p:spPr>
+        <p:txBody>
+          <a:bodyPr>
+            <a:normAutofit lnSpcReduction="10000"/>
+          </a:bodyPr>
+          <a:lstStyle/>
+          <a:p>
+            <a:pPr marL="0" indent="0">
+              <a:buNone/>
+            </a:pPr>
+            <a:r>
+              <a:rPr lang="en-US" sz="2000" dirty="0"/>
+              <a:t>Source:</a:t>
+            </a:r>
+          </a:p>
+          <a:p>
+            <a:r>
+              <a:rPr lang="en-US" sz="1600" dirty="0">
+                <a:hlinkClick r:id="rId2"/>
+              </a:rPr>
+              <a:t>https://simplemaps.com/data/us-cities</a:t>
+            </a:r>
+            <a:endParaRPr lang="en-US" sz="1600" dirty="0"/>
+          </a:p>
+          <a:p>
+            <a:pPr marL="0" indent="0">
+              <a:buNone/>
+            </a:pPr>
+            <a:endParaRPr lang="en-US" sz="1600" dirty="0"/>
+          </a:p>
+          <a:p>
+            <a:pPr marL="0" indent="0">
+              <a:buNone/>
+            </a:pPr>
+            <a:r>
+              <a:rPr lang="en-US" sz="2000" dirty="0"/>
+              <a:t>General Info:</a:t>
+            </a:r>
+          </a:p>
+          <a:p>
+            <a:r>
+              <a:rPr lang="en-US" sz="1600" dirty="0"/>
+              <a:t>Information on cities in the U.S.	</a:t>
+            </a:r>
+          </a:p>
+          <a:p>
+            <a:r>
+              <a:rPr lang="en-US" sz="1600" dirty="0"/>
+              <a:t>Updated as of November 18, 2020</a:t>
+            </a:r>
+          </a:p>
+          <a:p>
+            <a:r>
+              <a:rPr lang="en-US" sz="1600" dirty="0"/>
+              <a:t>Over 108,000 cities and towns from all 50 states</a:t>
+            </a:r>
+          </a:p>
+          <a:p>
+            <a:r>
+              <a:rPr lang="en-US" sz="1600" dirty="0"/>
+              <a:t>Population Density per city</a:t>
+            </a:r>
+          </a:p>
+        </p:txBody>
+      </p:sp>
+    </p:spTree>
+    <p:extLst>
+      <p:ext uri="{BB962C8B-B14F-4D97-AF65-F5344CB8AC3E}">
+        <p14:creationId xmlns:p14="http://schemas.microsoft.com/office/powerpoint/2010/main" val="451121760"/>
       </p:ext>
     </p:extLst>
   </p:cSld>

</xml_diff>